<commit_message>
updated master flow chart based on last year's changes
</commit_message>
<xml_diff>
--- a/documentation/SitzLabFlowCharts.pptx
+++ b/documentation/SitzLabFlowCharts.pptx
@@ -219,7 +219,7 @@
           <a:p>
             <a:fld id="{69F4FDD5-C72B-4F45-8090-6B70747CE7B7}" type="datetimeFigureOut">
               <a:rPr lang="en-US" smtClean="0"/>
-              <a:t>8/22/2014</a:t>
+              <a:t>1/13/2015</a:t>
             </a:fld>
             <a:endParaRPr lang="en-US"/>
           </a:p>
@@ -1004,7 +1004,7 @@
           <a:p>
             <a:fld id="{CFAADDE7-E0AC-4C08-9400-A11F1AA9DB05}" type="datetimeFigureOut">
               <a:rPr lang="en-US" smtClean="0"/>
-              <a:t>8/22/2014</a:t>
+              <a:t>1/13/2015</a:t>
             </a:fld>
             <a:endParaRPr lang="en-US"/>
           </a:p>
@@ -1174,7 +1174,7 @@
           <a:p>
             <a:fld id="{CFAADDE7-E0AC-4C08-9400-A11F1AA9DB05}" type="datetimeFigureOut">
               <a:rPr lang="en-US" smtClean="0"/>
-              <a:t>8/22/2014</a:t>
+              <a:t>1/13/2015</a:t>
             </a:fld>
             <a:endParaRPr lang="en-US"/>
           </a:p>
@@ -1354,7 +1354,7 @@
           <a:p>
             <a:fld id="{CFAADDE7-E0AC-4C08-9400-A11F1AA9DB05}" type="datetimeFigureOut">
               <a:rPr lang="en-US" smtClean="0"/>
-              <a:t>8/22/2014</a:t>
+              <a:t>1/13/2015</a:t>
             </a:fld>
             <a:endParaRPr lang="en-US"/>
           </a:p>
@@ -1524,7 +1524,7 @@
           <a:p>
             <a:fld id="{CFAADDE7-E0AC-4C08-9400-A11F1AA9DB05}" type="datetimeFigureOut">
               <a:rPr lang="en-US" smtClean="0"/>
-              <a:t>8/22/2014</a:t>
+              <a:t>1/13/2015</a:t>
             </a:fld>
             <a:endParaRPr lang="en-US"/>
           </a:p>
@@ -1770,7 +1770,7 @@
           <a:p>
             <a:fld id="{CFAADDE7-E0AC-4C08-9400-A11F1AA9DB05}" type="datetimeFigureOut">
               <a:rPr lang="en-US" smtClean="0"/>
-              <a:t>8/22/2014</a:t>
+              <a:t>1/13/2015</a:t>
             </a:fld>
             <a:endParaRPr lang="en-US"/>
           </a:p>
@@ -2058,7 +2058,7 @@
           <a:p>
             <a:fld id="{CFAADDE7-E0AC-4C08-9400-A11F1AA9DB05}" type="datetimeFigureOut">
               <a:rPr lang="en-US" smtClean="0"/>
-              <a:t>8/22/2014</a:t>
+              <a:t>1/13/2015</a:t>
             </a:fld>
             <a:endParaRPr lang="en-US"/>
           </a:p>
@@ -2480,7 +2480,7 @@
           <a:p>
             <a:fld id="{CFAADDE7-E0AC-4C08-9400-A11F1AA9DB05}" type="datetimeFigureOut">
               <a:rPr lang="en-US" smtClean="0"/>
-              <a:t>8/22/2014</a:t>
+              <a:t>1/13/2015</a:t>
             </a:fld>
             <a:endParaRPr lang="en-US"/>
           </a:p>
@@ -2598,7 +2598,7 @@
           <a:p>
             <a:fld id="{CFAADDE7-E0AC-4C08-9400-A11F1AA9DB05}" type="datetimeFigureOut">
               <a:rPr lang="en-US" smtClean="0"/>
-              <a:t>8/22/2014</a:t>
+              <a:t>1/13/2015</a:t>
             </a:fld>
             <a:endParaRPr lang="en-US"/>
           </a:p>
@@ -2693,7 +2693,7 @@
           <a:p>
             <a:fld id="{CFAADDE7-E0AC-4C08-9400-A11F1AA9DB05}" type="datetimeFigureOut">
               <a:rPr lang="en-US" smtClean="0"/>
-              <a:t>8/22/2014</a:t>
+              <a:t>1/13/2015</a:t>
             </a:fld>
             <a:endParaRPr lang="en-US"/>
           </a:p>
@@ -2970,7 +2970,7 @@
           <a:p>
             <a:fld id="{CFAADDE7-E0AC-4C08-9400-A11F1AA9DB05}" type="datetimeFigureOut">
               <a:rPr lang="en-US" smtClean="0"/>
-              <a:t>8/22/2014</a:t>
+              <a:t>1/13/2015</a:t>
             </a:fld>
             <a:endParaRPr lang="en-US"/>
           </a:p>
@@ -3223,7 +3223,7 @@
           <a:p>
             <a:fld id="{CFAADDE7-E0AC-4C08-9400-A11F1AA9DB05}" type="datetimeFigureOut">
               <a:rPr lang="en-US" smtClean="0"/>
-              <a:t>8/22/2014</a:t>
+              <a:t>1/13/2015</a:t>
             </a:fld>
             <a:endParaRPr lang="en-US"/>
           </a:p>
@@ -3436,7 +3436,7 @@
           <a:p>
             <a:fld id="{CFAADDE7-E0AC-4C08-9400-A11F1AA9DB05}" type="datetimeFigureOut">
               <a:rPr lang="en-US" smtClean="0"/>
-              <a:t>8/22/2014</a:t>
+              <a:t>1/13/2015</a:t>
             </a:fld>
             <a:endParaRPr lang="en-US"/>
           </a:p>
@@ -8094,14 +8094,114 @@
       </p:grpSpPr>
       <p:sp>
         <p:nvSpPr>
+          <p:cNvPr id="3" name="Rectangle 2"/>
+          <p:cNvSpPr/>
+          <p:nvPr/>
+        </p:nvSpPr>
+        <p:spPr>
+          <a:xfrm>
+            <a:off x="3209170" y="1136142"/>
+            <a:ext cx="968098" cy="1842098"/>
+          </a:xfrm>
+          <a:prstGeom prst="rect">
+            <a:avLst/>
+          </a:prstGeom>
+          <a:noFill/>
+          <a:ln w="15875">
+            <a:solidFill>
+              <a:schemeClr val="tx1"/>
+            </a:solidFill>
+          </a:ln>
+        </p:spPr>
+        <p:style>
+          <a:lnRef idx="2">
+            <a:schemeClr val="accent1">
+              <a:shade val="50000"/>
+            </a:schemeClr>
+          </a:lnRef>
+          <a:fillRef idx="1">
+            <a:schemeClr val="accent1"/>
+          </a:fillRef>
+          <a:effectRef idx="0">
+            <a:schemeClr val="accent1"/>
+          </a:effectRef>
+          <a:fontRef idx="minor">
+            <a:schemeClr val="lt1"/>
+          </a:fontRef>
+        </p:style>
+        <p:txBody>
+          <a:bodyPr rtlCol="0" anchor="ctr"/>
+          <a:lstStyle/>
+          <a:p>
+            <a:pPr algn="ctr"/>
+            <a:endParaRPr lang="en-US" sz="2400" dirty="0" smtClean="0">
+              <a:solidFill>
+                <a:schemeClr val="tx1"/>
+              </a:solidFill>
+            </a:endParaRPr>
+          </a:p>
+        </p:txBody>
+      </p:sp>
+      <p:sp>
+        <p:nvSpPr>
+          <p:cNvPr id="2" name="Rectangle 1"/>
+          <p:cNvSpPr/>
+          <p:nvPr/>
+        </p:nvSpPr>
+        <p:spPr>
+          <a:xfrm>
+            <a:off x="823521" y="1215390"/>
+            <a:ext cx="3309089" cy="1684020"/>
+          </a:xfrm>
+          <a:prstGeom prst="rect">
+            <a:avLst/>
+          </a:prstGeom>
+          <a:noFill/>
+          <a:ln w="15875">
+            <a:solidFill>
+              <a:schemeClr val="tx1"/>
+            </a:solidFill>
+          </a:ln>
+        </p:spPr>
+        <p:style>
+          <a:lnRef idx="2">
+            <a:schemeClr val="accent1">
+              <a:shade val="50000"/>
+            </a:schemeClr>
+          </a:lnRef>
+          <a:fillRef idx="1">
+            <a:schemeClr val="accent1"/>
+          </a:fillRef>
+          <a:effectRef idx="0">
+            <a:schemeClr val="accent1"/>
+          </a:effectRef>
+          <a:fontRef idx="minor">
+            <a:schemeClr val="lt1"/>
+          </a:fontRef>
+        </p:style>
+        <p:txBody>
+          <a:bodyPr rtlCol="0" anchor="ctr"/>
+          <a:lstStyle/>
+          <a:p>
+            <a:pPr algn="ctr"/>
+            <a:endParaRPr lang="en-US" sz="2400" dirty="0" smtClean="0">
+              <a:solidFill>
+                <a:schemeClr val="tx1"/>
+              </a:solidFill>
+            </a:endParaRPr>
+          </a:p>
+        </p:txBody>
+      </p:sp>
+      <p:sp>
+        <p:nvSpPr>
           <p:cNvPr id="41" name="Isosceles Triangle 40"/>
           <p:cNvSpPr/>
           <p:nvPr/>
         </p:nvSpPr>
         <p:spPr>
           <a:xfrm rot="16200000">
-            <a:off x="2558099" y="892272"/>
-            <a:ext cx="600087" cy="1187251"/>
+            <a:off x="1570672" y="996867"/>
+            <a:ext cx="1020148" cy="2191615"/>
           </a:xfrm>
           <a:prstGeom prst="triangle">
             <a:avLst/>
@@ -8136,7 +8236,7 @@
           <a:lstStyle/>
           <a:p>
             <a:pPr algn="ctr"/>
-            <a:endParaRPr lang="en-US" dirty="0" smtClean="0">
+            <a:endParaRPr lang="en-US" sz="2400" dirty="0" smtClean="0">
               <a:solidFill>
                 <a:schemeClr val="tx1"/>
               </a:solidFill>
@@ -8146,14 +8246,14 @@
       </p:sp>
       <p:sp>
         <p:nvSpPr>
-          <p:cNvPr id="2" name="Rectangle 1"/>
+          <p:cNvPr id="4" name="Rectangle 3"/>
           <p:cNvSpPr/>
           <p:nvPr/>
         </p:nvSpPr>
         <p:spPr>
           <a:xfrm>
-            <a:off x="2209800" y="979625"/>
-            <a:ext cx="1384136" cy="990600"/>
+            <a:off x="5040216" y="697226"/>
+            <a:ext cx="3166029" cy="2590801"/>
           </a:xfrm>
           <a:prstGeom prst="rect">
             <a:avLst/>
@@ -8186,7 +8286,7 @@
           <a:lstStyle/>
           <a:p>
             <a:pPr algn="ctr"/>
-            <a:endParaRPr lang="en-US" dirty="0" smtClean="0">
+            <a:endParaRPr lang="en-US" sz="2400" dirty="0" smtClean="0">
               <a:solidFill>
                 <a:schemeClr val="tx1"/>
               </a:solidFill>
@@ -8194,106 +8294,6 @@
           </a:p>
         </p:txBody>
       </p:sp>
-      <p:sp>
-        <p:nvSpPr>
-          <p:cNvPr id="3" name="Rectangle 2"/>
-          <p:cNvSpPr/>
-          <p:nvPr/>
-        </p:nvSpPr>
-        <p:spPr>
-          <a:xfrm>
-            <a:off x="3593936" y="979625"/>
-            <a:ext cx="586368" cy="990600"/>
-          </a:xfrm>
-          <a:prstGeom prst="rect">
-            <a:avLst/>
-          </a:prstGeom>
-          <a:noFill/>
-          <a:ln w="15875">
-            <a:solidFill>
-              <a:schemeClr val="tx1"/>
-            </a:solidFill>
-          </a:ln>
-        </p:spPr>
-        <p:style>
-          <a:lnRef idx="2">
-            <a:schemeClr val="accent1">
-              <a:shade val="50000"/>
-            </a:schemeClr>
-          </a:lnRef>
-          <a:fillRef idx="1">
-            <a:schemeClr val="accent1"/>
-          </a:fillRef>
-          <a:effectRef idx="0">
-            <a:schemeClr val="accent1"/>
-          </a:effectRef>
-          <a:fontRef idx="minor">
-            <a:schemeClr val="lt1"/>
-          </a:fontRef>
-        </p:style>
-        <p:txBody>
-          <a:bodyPr rtlCol="0" anchor="ctr"/>
-          <a:lstStyle/>
-          <a:p>
-            <a:pPr algn="ctr"/>
-            <a:endParaRPr lang="en-US" dirty="0" smtClean="0">
-              <a:solidFill>
-                <a:schemeClr val="tx1"/>
-              </a:solidFill>
-            </a:endParaRPr>
-          </a:p>
-        </p:txBody>
-      </p:sp>
-      <p:sp>
-        <p:nvSpPr>
-          <p:cNvPr id="4" name="Rectangle 3"/>
-          <p:cNvSpPr/>
-          <p:nvPr/>
-        </p:nvSpPr>
-        <p:spPr>
-          <a:xfrm>
-            <a:off x="4569897" y="762000"/>
-            <a:ext cx="1981200" cy="1524000"/>
-          </a:xfrm>
-          <a:prstGeom prst="rect">
-            <a:avLst/>
-          </a:prstGeom>
-          <a:noFill/>
-          <a:ln w="15875">
-            <a:solidFill>
-              <a:schemeClr val="tx1"/>
-            </a:solidFill>
-          </a:ln>
-        </p:spPr>
-        <p:style>
-          <a:lnRef idx="2">
-            <a:schemeClr val="accent1">
-              <a:shade val="50000"/>
-            </a:schemeClr>
-          </a:lnRef>
-          <a:fillRef idx="1">
-            <a:schemeClr val="accent1"/>
-          </a:fillRef>
-          <a:effectRef idx="0">
-            <a:schemeClr val="accent1"/>
-          </a:effectRef>
-          <a:fontRef idx="minor">
-            <a:schemeClr val="lt1"/>
-          </a:fontRef>
-        </p:style>
-        <p:txBody>
-          <a:bodyPr rtlCol="0" anchor="ctr"/>
-          <a:lstStyle/>
-          <a:p>
-            <a:pPr algn="ctr"/>
-            <a:endParaRPr lang="en-US" dirty="0" smtClean="0">
-              <a:solidFill>
-                <a:schemeClr val="tx1"/>
-              </a:solidFill>
-            </a:endParaRPr>
-          </a:p>
-        </p:txBody>
-      </p:sp>
       <p:grpSp>
         <p:nvGrpSpPr>
           <p:cNvPr id="13" name="Group 12"/>
@@ -8302,8 +8302,8 @@
         </p:nvGrpSpPr>
         <p:grpSpPr>
           <a:xfrm rot="5400000">
-            <a:off x="4267200" y="1295400"/>
-            <a:ext cx="228600" cy="381000"/>
+            <a:off x="4390472" y="1560056"/>
+            <a:ext cx="388620" cy="910867"/>
             <a:chOff x="2438400" y="3082158"/>
             <a:chExt cx="228600" cy="381000"/>
           </a:xfrm>
@@ -8350,7 +8350,7 @@
             <a:lstStyle/>
             <a:p>
               <a:pPr algn="ctr"/>
-              <a:endParaRPr lang="en-US" dirty="0" smtClean="0">
+              <a:endParaRPr lang="en-US" sz="2400" dirty="0" smtClean="0">
                 <a:solidFill>
                   <a:schemeClr val="tx1"/>
                 </a:solidFill>
@@ -8400,7 +8400,7 @@
             <a:lstStyle/>
             <a:p>
               <a:pPr algn="ctr"/>
-              <a:endParaRPr lang="en-US" dirty="0" smtClean="0">
+              <a:endParaRPr lang="en-US" sz="2400" dirty="0" smtClean="0">
                 <a:solidFill>
                   <a:schemeClr val="tx1"/>
                 </a:solidFill>
@@ -8532,8 +8532,8 @@
         </p:nvGrpSpPr>
         <p:grpSpPr>
           <a:xfrm>
-            <a:off x="3451766" y="1466848"/>
-            <a:ext cx="152400" cy="76201"/>
+            <a:off x="2880990" y="2033581"/>
+            <a:ext cx="364348" cy="129542"/>
             <a:chOff x="3139472" y="1481137"/>
             <a:chExt cx="152400" cy="76201"/>
           </a:xfrm>
@@ -8580,7 +8580,7 @@
             <a:lstStyle/>
             <a:p>
               <a:pPr algn="ctr"/>
-              <a:endParaRPr lang="en-US" dirty="0" smtClean="0">
+              <a:endParaRPr lang="en-US" sz="2400" dirty="0" smtClean="0">
                 <a:solidFill>
                   <a:schemeClr val="tx1"/>
                 </a:solidFill>
@@ -8671,8 +8671,8 @@
         </p:nvGrpSpPr>
         <p:grpSpPr>
           <a:xfrm>
-            <a:off x="3588894" y="1438273"/>
-            <a:ext cx="85657" cy="419101"/>
+            <a:off x="3200400" y="2030728"/>
+            <a:ext cx="204783" cy="712472"/>
             <a:chOff x="3291872" y="1452562"/>
             <a:chExt cx="85657" cy="419101"/>
           </a:xfrm>
@@ -8719,7 +8719,7 @@
             <a:lstStyle/>
             <a:p>
               <a:pPr algn="ctr"/>
-              <a:endParaRPr lang="en-US" dirty="0" smtClean="0">
+              <a:endParaRPr lang="en-US" sz="2400" dirty="0" smtClean="0">
                 <a:solidFill>
                   <a:schemeClr val="tx1"/>
                 </a:solidFill>
@@ -8775,8 +8775,8 @@
         </p:nvSpPr>
         <p:spPr>
           <a:xfrm rot="5400000">
-            <a:off x="2221473" y="1440662"/>
-            <a:ext cx="76200" cy="90487"/>
+            <a:off x="886516" y="1980661"/>
+            <a:ext cx="129542" cy="216333"/>
           </a:xfrm>
           <a:prstGeom prst="triangle">
             <a:avLst/>
@@ -8809,7 +8809,7 @@
           <a:lstStyle/>
           <a:p>
             <a:pPr algn="ctr"/>
-            <a:endParaRPr lang="en-US" dirty="0" smtClean="0">
+            <a:endParaRPr lang="en-US" sz="2400" dirty="0" smtClean="0">
               <a:solidFill>
                 <a:schemeClr val="tx1"/>
               </a:solidFill>
@@ -8825,8 +8825,8 @@
         </p:nvSpPr>
         <p:spPr>
           <a:xfrm>
-            <a:off x="2683082" y="924243"/>
-            <a:ext cx="558166" cy="261610"/>
+            <a:off x="1562813" y="1136142"/>
+            <a:ext cx="1334422" cy="461665"/>
           </a:xfrm>
           <a:prstGeom prst="rect">
             <a:avLst/>
@@ -8834,16 +8834,16 @@
           <a:noFill/>
         </p:spPr>
         <p:txBody>
-          <a:bodyPr wrap="none" rtlCol="0">
+          <a:bodyPr wrap="square" rtlCol="0">
             <a:spAutoFit/>
           </a:bodyPr>
           <a:lstStyle/>
           <a:p>
             <a:r>
-              <a:rPr lang="en-US" sz="1100" i="1" dirty="0" smtClean="0"/>
+              <a:rPr lang="en-US" sz="2400" i="1" dirty="0" smtClean="0"/>
               <a:t>source</a:t>
             </a:r>
-            <a:endParaRPr lang="en-US" i="1" dirty="0"/>
+            <a:endParaRPr lang="en-US" sz="2400" i="1" dirty="0"/>
           </a:p>
         </p:txBody>
       </p:sp>
@@ -8855,8 +8855,8 @@
         </p:nvSpPr>
         <p:spPr>
           <a:xfrm>
-            <a:off x="3635509" y="932739"/>
-            <a:ext cx="530915" cy="261610"/>
+            <a:off x="3209172" y="1136142"/>
+            <a:ext cx="1269273" cy="461665"/>
           </a:xfrm>
           <a:prstGeom prst="rect">
             <a:avLst/>
@@ -8864,16 +8864,16 @@
           <a:noFill/>
         </p:spPr>
         <p:txBody>
-          <a:bodyPr wrap="none" rtlCol="0">
+          <a:bodyPr wrap="square" rtlCol="0">
             <a:spAutoFit/>
           </a:bodyPr>
           <a:lstStyle/>
           <a:p>
             <a:r>
-              <a:rPr lang="en-US" sz="1100" i="1" dirty="0" smtClean="0"/>
+              <a:rPr lang="en-US" sz="2400" i="1" dirty="0" smtClean="0"/>
               <a:t>buffer</a:t>
             </a:r>
-            <a:endParaRPr lang="en-US" i="1" dirty="0"/>
+            <a:endParaRPr lang="en-US" sz="2400" i="1" dirty="0"/>
           </a:p>
         </p:txBody>
       </p:sp>
@@ -8885,8 +8885,8 @@
         </p:nvSpPr>
         <p:spPr>
           <a:xfrm>
-            <a:off x="5298564" y="728990"/>
-            <a:ext cx="473206" cy="261610"/>
+            <a:off x="6174579" y="637132"/>
+            <a:ext cx="1131306" cy="461665"/>
           </a:xfrm>
           <a:prstGeom prst="rect">
             <a:avLst/>
@@ -8894,134 +8894,19 @@
           <a:noFill/>
         </p:spPr>
         <p:txBody>
-          <a:bodyPr wrap="none" rtlCol="0">
+          <a:bodyPr wrap="square" rtlCol="0">
             <a:spAutoFit/>
           </a:bodyPr>
           <a:lstStyle/>
           <a:p>
             <a:r>
-              <a:rPr lang="en-US" sz="1100" i="1" dirty="0" smtClean="0"/>
+              <a:rPr lang="en-US" sz="2400" i="1" dirty="0" smtClean="0"/>
               <a:t>main</a:t>
             </a:r>
-            <a:endParaRPr lang="en-US" i="1" dirty="0"/>
-          </a:p>
-        </p:txBody>
-      </p:sp>
-      <p:grpSp>
-        <p:nvGrpSpPr>
-          <p:cNvPr id="35" name="Group 34"/>
-          <p:cNvGrpSpPr/>
-          <p:nvPr/>
-        </p:nvGrpSpPr>
-        <p:grpSpPr>
-          <a:xfrm>
-            <a:off x="6365294" y="1462086"/>
-            <a:ext cx="587824" cy="114300"/>
-            <a:chOff x="6365294" y="1462086"/>
-            <a:chExt cx="587824" cy="114300"/>
-          </a:xfrm>
-        </p:grpSpPr>
-        <p:sp>
-          <p:nvSpPr>
-            <p:cNvPr id="33" name="Rectangle 32"/>
-            <p:cNvSpPr/>
-            <p:nvPr/>
-          </p:nvSpPr>
-          <p:spPr>
-            <a:xfrm>
-              <a:off x="6551097" y="1462086"/>
-              <a:ext cx="402021" cy="114300"/>
-            </a:xfrm>
-            <a:prstGeom prst="rect">
-              <a:avLst/>
-            </a:prstGeom>
-            <a:noFill/>
-            <a:ln w="15875">
-              <a:solidFill>
-                <a:schemeClr val="tx1"/>
-              </a:solidFill>
-            </a:ln>
-          </p:spPr>
-          <p:style>
-            <a:lnRef idx="2">
-              <a:schemeClr val="accent1">
-                <a:shade val="50000"/>
-              </a:schemeClr>
-            </a:lnRef>
-            <a:fillRef idx="1">
-              <a:schemeClr val="accent1"/>
-            </a:fillRef>
-            <a:effectRef idx="0">
-              <a:schemeClr val="accent1"/>
-            </a:effectRef>
-            <a:fontRef idx="minor">
-              <a:schemeClr val="lt1"/>
-            </a:fontRef>
-          </p:style>
-          <p:txBody>
-            <a:bodyPr rtlCol="0" anchor="ctr"/>
-            <a:lstStyle/>
-            <a:p>
-              <a:pPr algn="ctr"/>
-              <a:endParaRPr lang="en-US" dirty="0" smtClean="0">
-                <a:solidFill>
-                  <a:schemeClr val="tx1"/>
-                </a:solidFill>
-              </a:endParaRPr>
-            </a:p>
-          </p:txBody>
-        </p:sp>
-        <p:sp>
-          <p:nvSpPr>
-            <p:cNvPr id="34" name="Rectangle 33"/>
-            <p:cNvSpPr/>
-            <p:nvPr/>
-          </p:nvSpPr>
-          <p:spPr>
-            <a:xfrm>
-              <a:off x="6365294" y="1481136"/>
-              <a:ext cx="402021" cy="76199"/>
-            </a:xfrm>
-            <a:prstGeom prst="rect">
-              <a:avLst/>
-            </a:prstGeom>
-            <a:solidFill>
-              <a:schemeClr val="bg1"/>
-            </a:solidFill>
-            <a:ln w="15875">
-              <a:noFill/>
-            </a:ln>
-          </p:spPr>
-          <p:style>
-            <a:lnRef idx="2">
-              <a:schemeClr val="accent1">
-                <a:shade val="50000"/>
-              </a:schemeClr>
-            </a:lnRef>
-            <a:fillRef idx="1">
-              <a:schemeClr val="accent1"/>
-            </a:fillRef>
-            <a:effectRef idx="0">
-              <a:schemeClr val="accent1"/>
-            </a:effectRef>
-            <a:fontRef idx="minor">
-              <a:schemeClr val="lt1"/>
-            </a:fontRef>
-          </p:style>
-          <p:txBody>
-            <a:bodyPr rtlCol="0" anchor="ctr"/>
-            <a:lstStyle/>
-            <a:p>
-              <a:pPr algn="ctr"/>
-              <a:endParaRPr lang="en-US" dirty="0" smtClean="0">
-                <a:solidFill>
-                  <a:schemeClr val="tx1"/>
-                </a:solidFill>
-              </a:endParaRPr>
-            </a:p>
-          </p:txBody>
-        </p:sp>
-      </p:grpSp>
+            <a:endParaRPr lang="en-US" sz="2400" i="1" dirty="0"/>
+          </a:p>
+        </p:txBody>
+      </p:sp>
       <p:sp>
         <p:nvSpPr>
           <p:cNvPr id="36" name="TextBox 35"/>
@@ -9030,8 +8915,8 @@
         </p:nvSpPr>
         <p:spPr>
           <a:xfrm>
-            <a:off x="2159218" y="1471618"/>
-            <a:ext cx="412292" cy="200055"/>
+            <a:off x="761538" y="2033581"/>
+            <a:ext cx="985678" cy="369332"/>
           </a:xfrm>
           <a:prstGeom prst="rect">
             <a:avLst/>
@@ -9039,13 +8924,13 @@
           <a:noFill/>
         </p:spPr>
         <p:txBody>
-          <a:bodyPr wrap="none" rtlCol="0">
+          <a:bodyPr wrap="square" rtlCol="0">
             <a:spAutoFit/>
           </a:bodyPr>
           <a:lstStyle/>
           <a:p>
             <a:r>
-              <a:rPr lang="en-US" sz="700" i="1" dirty="0" smtClean="0"/>
+              <a:rPr lang="en-US" i="1" dirty="0" smtClean="0"/>
               <a:t>nozzle</a:t>
             </a:r>
             <a:endParaRPr lang="en-US" i="1" dirty="0"/>
@@ -9060,8 +8945,8 @@
         </p:nvSpPr>
         <p:spPr>
           <a:xfrm>
-            <a:off x="3176553" y="1514080"/>
-            <a:ext cx="495649" cy="200055"/>
+            <a:off x="2216208" y="1713055"/>
+            <a:ext cx="1184963" cy="369332"/>
           </a:xfrm>
           <a:prstGeom prst="rect">
             <a:avLst/>
@@ -9069,13 +8954,13 @@
           <a:noFill/>
         </p:spPr>
         <p:txBody>
-          <a:bodyPr wrap="none" rtlCol="0">
+          <a:bodyPr wrap="square" rtlCol="0">
             <a:spAutoFit/>
           </a:bodyPr>
           <a:lstStyle/>
           <a:p>
             <a:r>
-              <a:rPr lang="en-US" sz="700" i="1" dirty="0" smtClean="0"/>
+              <a:rPr lang="en-US" i="1" dirty="0" smtClean="0"/>
               <a:t>skimmer</a:t>
             </a:r>
             <a:endParaRPr lang="en-US" i="1" dirty="0"/>
@@ -9090,8 +8975,8 @@
         </p:nvSpPr>
         <p:spPr>
           <a:xfrm>
-            <a:off x="3537351" y="1809747"/>
-            <a:ext cx="481222" cy="200055"/>
+            <a:off x="3229662" y="2602468"/>
+            <a:ext cx="1342338" cy="369332"/>
           </a:xfrm>
           <a:prstGeom prst="rect">
             <a:avLst/>
@@ -9099,13 +8984,13 @@
           <a:noFill/>
         </p:spPr>
         <p:txBody>
-          <a:bodyPr wrap="none" rtlCol="0">
+          <a:bodyPr wrap="square" rtlCol="0">
             <a:spAutoFit/>
           </a:bodyPr>
           <a:lstStyle/>
           <a:p>
             <a:r>
-              <a:rPr lang="en-US" sz="700" i="1" dirty="0" smtClean="0"/>
+              <a:rPr lang="en-US" i="1" dirty="0" smtClean="0"/>
               <a:t>chopper</a:t>
             </a:r>
             <a:endParaRPr lang="en-US" i="1" dirty="0"/>
@@ -9120,8 +9005,8 @@
         </p:nvSpPr>
         <p:spPr>
           <a:xfrm>
-            <a:off x="4131021" y="1557010"/>
-            <a:ext cx="498855" cy="307777"/>
+            <a:off x="4141374" y="2133600"/>
+            <a:ext cx="1192626" cy="615553"/>
           </a:xfrm>
           <a:prstGeom prst="rect">
             <a:avLst/>
@@ -9129,56 +9014,26 @@
           <a:noFill/>
         </p:spPr>
         <p:txBody>
-          <a:bodyPr wrap="none" rtlCol="0">
+          <a:bodyPr wrap="square" rtlCol="0">
             <a:spAutoFit/>
           </a:bodyPr>
           <a:lstStyle/>
           <a:p>
             <a:r>
-              <a:rPr lang="en-US" sz="700" i="1" dirty="0"/>
+              <a:rPr lang="en-US" sz="1700" i="1" dirty="0"/>
               <a:t>i</a:t>
             </a:r>
             <a:r>
-              <a:rPr lang="en-US" sz="700" i="1" dirty="0" smtClean="0"/>
+              <a:rPr lang="en-US" sz="1700" i="1" dirty="0" smtClean="0"/>
               <a:t>solation</a:t>
             </a:r>
           </a:p>
           <a:p>
             <a:r>
-              <a:rPr lang="en-US" sz="700" i="1" dirty="0" smtClean="0"/>
+              <a:rPr lang="en-US" sz="1700" i="1" dirty="0" smtClean="0"/>
               <a:t>valve</a:t>
             </a:r>
-            <a:endParaRPr lang="en-US" i="1" dirty="0"/>
-          </a:p>
-        </p:txBody>
-      </p:sp>
-      <p:sp>
-        <p:nvSpPr>
-          <p:cNvPr id="40" name="TextBox 39"/>
-          <p:cNvSpPr txBox="1"/>
-          <p:nvPr/>
-        </p:nvSpPr>
-        <p:spPr>
-          <a:xfrm>
-            <a:off x="6561169" y="1419207"/>
-            <a:ext cx="360996" cy="200055"/>
-          </a:xfrm>
-          <a:prstGeom prst="rect">
-            <a:avLst/>
-          </a:prstGeom>
-          <a:noFill/>
-        </p:spPr>
-        <p:txBody>
-          <a:bodyPr wrap="none" rtlCol="0">
-            <a:spAutoFit/>
-          </a:bodyPr>
-          <a:lstStyle/>
-          <a:p>
-            <a:r>
-              <a:rPr lang="en-US" sz="700" i="1" dirty="0" smtClean="0"/>
-              <a:t>QMS</a:t>
-            </a:r>
-            <a:endParaRPr lang="en-US" i="1" dirty="0"/>
+            <a:endParaRPr lang="en-US" sz="1700" i="1" dirty="0"/>
           </a:p>
         </p:txBody>
       </p:sp>
@@ -9190,8 +9045,8 @@
         </p:nvSpPr>
         <p:spPr>
           <a:xfrm>
-            <a:off x="3892283" y="1478270"/>
-            <a:ext cx="98771" cy="45719"/>
+            <a:off x="3620793" y="2055878"/>
+            <a:ext cx="236133" cy="77722"/>
           </a:xfrm>
           <a:prstGeom prst="rect">
             <a:avLst/>
@@ -9226,7 +9081,7 @@
           <a:lstStyle/>
           <a:p>
             <a:pPr algn="ctr"/>
-            <a:endParaRPr lang="en-US" dirty="0" smtClean="0">
+            <a:endParaRPr lang="en-US" sz="2400" dirty="0" smtClean="0">
               <a:solidFill>
                 <a:schemeClr val="tx1"/>
               </a:solidFill>
@@ -9242,8 +9097,8 @@
         </p:nvSpPr>
         <p:spPr>
           <a:xfrm>
-            <a:off x="4810740" y="1497475"/>
-            <a:ext cx="98771" cy="45719"/>
+            <a:off x="5637852" y="2035198"/>
+            <a:ext cx="236133" cy="77722"/>
           </a:xfrm>
           <a:prstGeom prst="rect">
             <a:avLst/>
@@ -9278,7 +9133,7 @@
           <a:lstStyle/>
           <a:p>
             <a:pPr algn="ctr"/>
-            <a:endParaRPr lang="en-US" dirty="0" smtClean="0">
+            <a:endParaRPr lang="en-US" sz="2400" dirty="0" smtClean="0">
               <a:solidFill>
                 <a:schemeClr val="tx1"/>
               </a:solidFill>
@@ -9286,94 +9141,16 @@
           </a:p>
         </p:txBody>
       </p:sp>
-      <p:cxnSp>
-        <p:nvCxnSpPr>
-          <p:cNvPr id="48" name="Straight Connector 47"/>
-          <p:cNvCxnSpPr>
-            <a:endCxn id="50" idx="1"/>
-          </p:cNvCxnSpPr>
-          <p:nvPr/>
-        </p:nvCxnSpPr>
-        <p:spPr>
-          <a:xfrm>
-            <a:off x="4953000" y="762000"/>
-            <a:ext cx="0" cy="776296"/>
-          </a:xfrm>
-          <a:prstGeom prst="line">
-            <a:avLst/>
-          </a:prstGeom>
-          <a:ln w="19050">
-            <a:solidFill>
-              <a:schemeClr val="tx1"/>
-            </a:solidFill>
-            <a:headEnd type="none"/>
-            <a:tailEnd type="none"/>
-          </a:ln>
-        </p:spPr>
-        <p:style>
-          <a:lnRef idx="1">
-            <a:schemeClr val="accent1"/>
-          </a:lnRef>
-          <a:fillRef idx="0">
-            <a:schemeClr val="accent1"/>
-          </a:fillRef>
-          <a:effectRef idx="0">
-            <a:schemeClr val="accent1"/>
-          </a:effectRef>
-          <a:fontRef idx="minor">
-            <a:schemeClr val="tx1"/>
-          </a:fontRef>
-        </p:style>
-      </p:cxnSp>
-      <p:cxnSp>
-        <p:nvCxnSpPr>
-          <p:cNvPr id="49" name="Straight Connector 48"/>
-          <p:cNvCxnSpPr>
-            <a:endCxn id="50" idx="3"/>
-          </p:cNvCxnSpPr>
-          <p:nvPr/>
-        </p:nvCxnSpPr>
-        <p:spPr>
-          <a:xfrm>
-            <a:off x="5029200" y="761999"/>
-            <a:ext cx="0" cy="776297"/>
-          </a:xfrm>
-          <a:prstGeom prst="line">
-            <a:avLst/>
-          </a:prstGeom>
-          <a:ln w="19050">
-            <a:solidFill>
-              <a:schemeClr val="tx1"/>
-            </a:solidFill>
-            <a:headEnd type="none"/>
-            <a:tailEnd type="none"/>
-          </a:ln>
-        </p:spPr>
-        <p:style>
-          <a:lnRef idx="1">
-            <a:schemeClr val="accent1"/>
-          </a:lnRef>
-          <a:fillRef idx="0">
-            <a:schemeClr val="accent1"/>
-          </a:fillRef>
-          <a:effectRef idx="0">
-            <a:schemeClr val="accent1"/>
-          </a:effectRef>
-          <a:fontRef idx="minor">
-            <a:schemeClr val="tx1"/>
-          </a:fontRef>
-        </p:style>
-      </p:cxnSp>
-      <p:sp>
-        <p:nvSpPr>
-          <p:cNvPr id="50" name="Rectangle 49"/>
+      <p:sp>
+        <p:nvSpPr>
+          <p:cNvPr id="42" name="Rectangle 41"/>
           <p:cNvSpPr/>
           <p:nvPr/>
         </p:nvSpPr>
         <p:spPr>
           <a:xfrm>
-            <a:off x="4953000" y="1504947"/>
-            <a:ext cx="76200" cy="66698"/>
+            <a:off x="4984363" y="637132"/>
+            <a:ext cx="626589" cy="2715668"/>
           </a:xfrm>
           <a:prstGeom prst="rect">
             <a:avLst/>
@@ -9406,7 +9183,7 @@
           <a:lstStyle/>
           <a:p>
             <a:pPr algn="ctr"/>
-            <a:endParaRPr lang="en-US" dirty="0" smtClean="0">
+            <a:endParaRPr lang="en-US" sz="2400" dirty="0" smtClean="0">
               <a:solidFill>
                 <a:schemeClr val="tx1"/>
               </a:solidFill>
@@ -9416,14 +9193,14 @@
       </p:sp>
       <p:sp>
         <p:nvSpPr>
-          <p:cNvPr id="53" name="TextBox 52"/>
+          <p:cNvPr id="45" name="TextBox 44"/>
           <p:cNvSpPr txBox="1"/>
           <p:nvPr/>
         </p:nvSpPr>
         <p:spPr>
           <a:xfrm>
-            <a:off x="4821682" y="1533523"/>
-            <a:ext cx="450764" cy="200055"/>
+            <a:off x="3551401" y="773164"/>
+            <a:ext cx="1269273" cy="461665"/>
           </a:xfrm>
           <a:prstGeom prst="rect">
             <a:avLst/>
@@ -9431,16 +9208,46 @@
           <a:noFill/>
         </p:spPr>
         <p:txBody>
-          <a:bodyPr wrap="none" rtlCol="0">
+          <a:bodyPr wrap="square" rtlCol="0">
             <a:spAutoFit/>
           </a:bodyPr>
           <a:lstStyle/>
           <a:p>
             <a:r>
-              <a:rPr lang="en-US" sz="700" i="1" dirty="0" smtClean="0"/>
-              <a:t>surface</a:t>
-            </a:r>
-            <a:endParaRPr lang="en-US" i="1" dirty="0"/>
+              <a:rPr lang="en-US" sz="2400" i="1" dirty="0" smtClean="0"/>
+              <a:t>seals</a:t>
+            </a:r>
+            <a:endParaRPr lang="en-US" sz="2400" i="1" dirty="0"/>
+          </a:p>
+        </p:txBody>
+      </p:sp>
+      <p:sp>
+        <p:nvSpPr>
+          <p:cNvPr id="47" name="TextBox 46"/>
+          <p:cNvSpPr txBox="1"/>
+          <p:nvPr/>
+        </p:nvSpPr>
+        <p:spPr>
+          <a:xfrm>
+            <a:off x="4877379" y="284192"/>
+            <a:ext cx="1269273" cy="461665"/>
+          </a:xfrm>
+          <a:prstGeom prst="rect">
+            <a:avLst/>
+          </a:prstGeom>
+          <a:noFill/>
+        </p:spPr>
+        <p:txBody>
+          <a:bodyPr wrap="square" rtlCol="0">
+            <a:spAutoFit/>
+          </a:bodyPr>
+          <a:lstStyle/>
+          <a:p>
+            <a:r>
+              <a:rPr lang="en-US" sz="2400" i="1" dirty="0" smtClean="0"/>
+              <a:t>seals</a:t>
+            </a:r>
+            <a:endParaRPr lang="en-US" sz="2400" i="1" dirty="0"/>
           </a:p>
         </p:txBody>
       </p:sp>
@@ -9476,14 +9283,14 @@
       </p:grpSpPr>
       <p:sp>
         <p:nvSpPr>
-          <p:cNvPr id="109" name="Rectangle 108"/>
+          <p:cNvPr id="42" name="Rectangle 41"/>
           <p:cNvSpPr/>
           <p:nvPr/>
         </p:nvSpPr>
         <p:spPr>
           <a:xfrm>
-            <a:off x="3698213" y="62125"/>
-            <a:ext cx="592215" cy="1591979"/>
+            <a:off x="1016836" y="2901221"/>
+            <a:ext cx="1988733" cy="1498533"/>
           </a:xfrm>
           <a:prstGeom prst="rect">
             <a:avLst/>
@@ -9526,14 +9333,50 @@
       </p:sp>
       <p:sp>
         <p:nvSpPr>
-          <p:cNvPr id="108" name="Rectangle 107"/>
+          <p:cNvPr id="45" name="TextBox 44"/>
+          <p:cNvSpPr txBox="1"/>
+          <p:nvPr/>
+        </p:nvSpPr>
+        <p:spPr>
+          <a:xfrm>
+            <a:off x="1494984" y="2887247"/>
+            <a:ext cx="1086195" cy="707886"/>
+          </a:xfrm>
+          <a:prstGeom prst="rect">
+            <a:avLst/>
+          </a:prstGeom>
+          <a:noFill/>
+        </p:spPr>
+        <p:txBody>
+          <a:bodyPr wrap="none" rtlCol="0">
+            <a:spAutoFit/>
+          </a:bodyPr>
+          <a:lstStyle/>
+          <a:p>
+            <a:r>
+              <a:rPr lang="en-US" sz="2000" i="1" dirty="0" smtClean="0"/>
+              <a:t>diffusion</a:t>
+            </a:r>
+          </a:p>
+          <a:p>
+            <a:r>
+              <a:rPr lang="en-US" sz="2000" i="1" dirty="0" smtClean="0"/>
+              <a:t>pump</a:t>
+            </a:r>
+            <a:endParaRPr lang="en-US" sz="2000" i="1" dirty="0" smtClean="0"/>
+          </a:p>
+        </p:txBody>
+      </p:sp>
+      <p:sp>
+        <p:nvSpPr>
+          <p:cNvPr id="46" name="Rectangle 45"/>
           <p:cNvSpPr/>
           <p:nvPr/>
         </p:nvSpPr>
         <p:spPr>
           <a:xfrm>
-            <a:off x="2783155" y="247571"/>
-            <a:ext cx="592215" cy="1081155"/>
+            <a:off x="3245338" y="2906461"/>
+            <a:ext cx="853920" cy="1174668"/>
           </a:xfrm>
           <a:prstGeom prst="rect">
             <a:avLst/>
@@ -9576,587 +9419,14 @@
       </p:sp>
       <p:sp>
         <p:nvSpPr>
-          <p:cNvPr id="2" name="Rectangle 1"/>
-          <p:cNvSpPr/>
-          <p:nvPr/>
-        </p:nvSpPr>
-        <p:spPr>
-          <a:xfrm>
-            <a:off x="1373703" y="305688"/>
-            <a:ext cx="1384136" cy="990600"/>
-          </a:xfrm>
-          <a:prstGeom prst="rect">
-            <a:avLst/>
-          </a:prstGeom>
-          <a:noFill/>
-          <a:ln w="15875">
-            <a:solidFill>
-              <a:schemeClr val="tx1"/>
-            </a:solidFill>
-          </a:ln>
-        </p:spPr>
-        <p:style>
-          <a:lnRef idx="2">
-            <a:schemeClr val="accent1">
-              <a:shade val="50000"/>
-            </a:schemeClr>
-          </a:lnRef>
-          <a:fillRef idx="1">
-            <a:schemeClr val="accent1"/>
-          </a:fillRef>
-          <a:effectRef idx="0">
-            <a:schemeClr val="accent1"/>
-          </a:effectRef>
-          <a:fontRef idx="minor">
-            <a:schemeClr val="lt1"/>
-          </a:fontRef>
-        </p:style>
-        <p:txBody>
-          <a:bodyPr rtlCol="0" anchor="ctr"/>
-          <a:lstStyle/>
-          <a:p>
-            <a:pPr algn="ctr"/>
-            <a:endParaRPr lang="en-US" dirty="0" smtClean="0">
-              <a:solidFill>
-                <a:schemeClr val="tx1"/>
-              </a:solidFill>
-            </a:endParaRPr>
-          </a:p>
-        </p:txBody>
-      </p:sp>
-      <p:sp>
-        <p:nvSpPr>
-          <p:cNvPr id="3" name="Rectangle 2"/>
-          <p:cNvSpPr/>
-          <p:nvPr/>
-        </p:nvSpPr>
-        <p:spPr>
-          <a:xfrm>
-            <a:off x="2757839" y="305688"/>
-            <a:ext cx="586368" cy="990600"/>
-          </a:xfrm>
-          <a:prstGeom prst="rect">
-            <a:avLst/>
-          </a:prstGeom>
-          <a:solidFill>
-            <a:schemeClr val="bg1"/>
-          </a:solidFill>
-          <a:ln w="15875">
-            <a:solidFill>
-              <a:schemeClr val="tx1"/>
-            </a:solidFill>
-          </a:ln>
-        </p:spPr>
-        <p:style>
-          <a:lnRef idx="2">
-            <a:schemeClr val="accent1">
-              <a:shade val="50000"/>
-            </a:schemeClr>
-          </a:lnRef>
-          <a:fillRef idx="1">
-            <a:schemeClr val="accent1"/>
-          </a:fillRef>
-          <a:effectRef idx="0">
-            <a:schemeClr val="accent1"/>
-          </a:effectRef>
-          <a:fontRef idx="minor">
-            <a:schemeClr val="lt1"/>
-          </a:fontRef>
-        </p:style>
-        <p:txBody>
-          <a:bodyPr rtlCol="0" anchor="ctr"/>
-          <a:lstStyle/>
-          <a:p>
-            <a:pPr algn="ctr"/>
-            <a:endParaRPr lang="en-US" dirty="0" smtClean="0">
-              <a:solidFill>
-                <a:schemeClr val="tx1"/>
-              </a:solidFill>
-            </a:endParaRPr>
-          </a:p>
-        </p:txBody>
-      </p:sp>
-      <p:sp>
-        <p:nvSpPr>
-          <p:cNvPr id="4" name="Rectangle 3"/>
-          <p:cNvSpPr/>
-          <p:nvPr/>
-        </p:nvSpPr>
-        <p:spPr>
-          <a:xfrm>
-            <a:off x="3733800" y="88063"/>
-            <a:ext cx="1981200" cy="1524000"/>
-          </a:xfrm>
-          <a:prstGeom prst="rect">
-            <a:avLst/>
-          </a:prstGeom>
-          <a:solidFill>
-            <a:schemeClr val="bg1"/>
-          </a:solidFill>
-          <a:ln w="15875">
-            <a:solidFill>
-              <a:schemeClr val="tx1"/>
-            </a:solidFill>
-          </a:ln>
-        </p:spPr>
-        <p:style>
-          <a:lnRef idx="2">
-            <a:schemeClr val="accent1">
-              <a:shade val="50000"/>
-            </a:schemeClr>
-          </a:lnRef>
-          <a:fillRef idx="1">
-            <a:schemeClr val="accent1"/>
-          </a:fillRef>
-          <a:effectRef idx="0">
-            <a:schemeClr val="accent1"/>
-          </a:effectRef>
-          <a:fontRef idx="minor">
-            <a:schemeClr val="lt1"/>
-          </a:fontRef>
-        </p:style>
-        <p:txBody>
-          <a:bodyPr rtlCol="0" anchor="ctr"/>
-          <a:lstStyle/>
-          <a:p>
-            <a:pPr algn="ctr"/>
-            <a:endParaRPr lang="en-US" dirty="0" smtClean="0">
-              <a:solidFill>
-                <a:schemeClr val="tx1"/>
-              </a:solidFill>
-            </a:endParaRPr>
-          </a:p>
-        </p:txBody>
-      </p:sp>
-      <p:grpSp>
-        <p:nvGrpSpPr>
-          <p:cNvPr id="13" name="Group 12"/>
-          <p:cNvGrpSpPr/>
-          <p:nvPr/>
-        </p:nvGrpSpPr>
-        <p:grpSpPr>
-          <a:xfrm rot="5400000">
-            <a:off x="3431103" y="621463"/>
-            <a:ext cx="228600" cy="381000"/>
-            <a:chOff x="2438400" y="3082158"/>
-            <a:chExt cx="228600" cy="381000"/>
-          </a:xfrm>
-        </p:grpSpPr>
-        <p:sp>
-          <p:nvSpPr>
-            <p:cNvPr id="5" name="Isosceles Triangle 4"/>
-            <p:cNvSpPr/>
-            <p:nvPr/>
-          </p:nvSpPr>
-          <p:spPr>
-            <a:xfrm>
-              <a:off x="2514600" y="3255579"/>
-              <a:ext cx="152400" cy="131379"/>
-            </a:xfrm>
-            <a:prstGeom prst="triangle">
-              <a:avLst/>
-            </a:prstGeom>
-            <a:noFill/>
-            <a:ln w="15875">
-              <a:solidFill>
-                <a:schemeClr val="tx1"/>
-              </a:solidFill>
-            </a:ln>
-          </p:spPr>
-          <p:style>
-            <a:lnRef idx="2">
-              <a:schemeClr val="accent1">
-                <a:shade val="50000"/>
-              </a:schemeClr>
-            </a:lnRef>
-            <a:fillRef idx="1">
-              <a:schemeClr val="accent1"/>
-            </a:fillRef>
-            <a:effectRef idx="0">
-              <a:schemeClr val="accent1"/>
-            </a:effectRef>
-            <a:fontRef idx="minor">
-              <a:schemeClr val="lt1"/>
-            </a:fontRef>
-          </p:style>
-          <p:txBody>
-            <a:bodyPr rtlCol="0" anchor="ctr"/>
-            <a:lstStyle/>
-            <a:p>
-              <a:pPr algn="ctr"/>
-              <a:endParaRPr lang="en-US" dirty="0" smtClean="0">
-                <a:solidFill>
-                  <a:schemeClr val="tx1"/>
-                </a:solidFill>
-              </a:endParaRPr>
-            </a:p>
-          </p:txBody>
-        </p:sp>
-        <p:sp>
-          <p:nvSpPr>
-            <p:cNvPr id="6" name="Isosceles Triangle 5"/>
-            <p:cNvSpPr/>
-            <p:nvPr/>
-          </p:nvSpPr>
-          <p:spPr>
-            <a:xfrm flipV="1">
-              <a:off x="2514600" y="3124200"/>
-              <a:ext cx="152400" cy="131379"/>
-            </a:xfrm>
-            <a:prstGeom prst="triangle">
-              <a:avLst/>
-            </a:prstGeom>
-            <a:noFill/>
-            <a:ln w="15875">
-              <a:solidFill>
-                <a:schemeClr val="tx1"/>
-              </a:solidFill>
-            </a:ln>
-          </p:spPr>
-          <p:style>
-            <a:lnRef idx="2">
-              <a:schemeClr val="accent1">
-                <a:shade val="50000"/>
-              </a:schemeClr>
-            </a:lnRef>
-            <a:fillRef idx="1">
-              <a:schemeClr val="accent1"/>
-            </a:fillRef>
-            <a:effectRef idx="0">
-              <a:schemeClr val="accent1"/>
-            </a:effectRef>
-            <a:fontRef idx="minor">
-              <a:schemeClr val="lt1"/>
-            </a:fontRef>
-          </p:style>
-          <p:txBody>
-            <a:bodyPr rtlCol="0" anchor="ctr"/>
-            <a:lstStyle/>
-            <a:p>
-              <a:pPr algn="ctr"/>
-              <a:endParaRPr lang="en-US" dirty="0" smtClean="0">
-                <a:solidFill>
-                  <a:schemeClr val="tx1"/>
-                </a:solidFill>
-              </a:endParaRPr>
-            </a:p>
-          </p:txBody>
-        </p:sp>
-        <p:cxnSp>
-          <p:nvCxnSpPr>
-            <p:cNvPr id="8" name="Straight Connector 7"/>
-            <p:cNvCxnSpPr>
-              <a:stCxn id="6" idx="0"/>
-            </p:cNvCxnSpPr>
-            <p:nvPr/>
-          </p:nvCxnSpPr>
-          <p:spPr>
-            <a:xfrm flipH="1">
-              <a:off x="2438400" y="3255579"/>
-              <a:ext cx="152400" cy="0"/>
-            </a:xfrm>
-            <a:prstGeom prst="line">
-              <a:avLst/>
-            </a:prstGeom>
-            <a:ln w="19050">
-              <a:solidFill>
-                <a:schemeClr val="tx1"/>
-              </a:solidFill>
-              <a:headEnd type="triangle"/>
-              <a:tailEnd type="none"/>
-            </a:ln>
-          </p:spPr>
-          <p:style>
-            <a:lnRef idx="1">
-              <a:schemeClr val="accent1"/>
-            </a:lnRef>
-            <a:fillRef idx="0">
-              <a:schemeClr val="accent1"/>
-            </a:fillRef>
-            <a:effectRef idx="0">
-              <a:schemeClr val="accent1"/>
-            </a:effectRef>
-            <a:fontRef idx="minor">
-              <a:schemeClr val="tx1"/>
-            </a:fontRef>
-          </p:style>
-        </p:cxnSp>
-        <p:cxnSp>
-          <p:nvCxnSpPr>
-            <p:cNvPr id="11" name="Straight Connector 10"/>
-            <p:cNvCxnSpPr>
-              <a:stCxn id="6" idx="3"/>
-            </p:cNvCxnSpPr>
-            <p:nvPr/>
-          </p:nvCxnSpPr>
-          <p:spPr>
-            <a:xfrm rot="16200000" flipV="1">
-              <a:off x="2569780" y="3103178"/>
-              <a:ext cx="42041" cy="1"/>
-            </a:xfrm>
-            <a:prstGeom prst="line">
-              <a:avLst/>
-            </a:prstGeom>
-            <a:ln w="19050">
-              <a:solidFill>
-                <a:schemeClr val="tx1"/>
-              </a:solidFill>
-              <a:headEnd type="none"/>
-              <a:tailEnd type="none"/>
-            </a:ln>
-          </p:spPr>
-          <p:style>
-            <a:lnRef idx="1">
-              <a:schemeClr val="accent1"/>
-            </a:lnRef>
-            <a:fillRef idx="0">
-              <a:schemeClr val="accent1"/>
-            </a:fillRef>
-            <a:effectRef idx="0">
-              <a:schemeClr val="accent1"/>
-            </a:effectRef>
-            <a:fontRef idx="minor">
-              <a:schemeClr val="tx1"/>
-            </a:fontRef>
-          </p:style>
-        </p:cxnSp>
-        <p:cxnSp>
-          <p:nvCxnSpPr>
-            <p:cNvPr id="12" name="Straight Connector 11"/>
-            <p:cNvCxnSpPr/>
-            <p:nvPr/>
-          </p:nvCxnSpPr>
-          <p:spPr>
-            <a:xfrm rot="16200000">
-              <a:off x="2552700" y="3425058"/>
-              <a:ext cx="76200" cy="0"/>
-            </a:xfrm>
-            <a:prstGeom prst="line">
-              <a:avLst/>
-            </a:prstGeom>
-            <a:ln w="19050">
-              <a:solidFill>
-                <a:schemeClr val="tx1"/>
-              </a:solidFill>
-              <a:headEnd type="none"/>
-              <a:tailEnd type="none"/>
-            </a:ln>
-          </p:spPr>
-          <p:style>
-            <a:lnRef idx="1">
-              <a:schemeClr val="accent1"/>
-            </a:lnRef>
-            <a:fillRef idx="0">
-              <a:schemeClr val="accent1"/>
-            </a:fillRef>
-            <a:effectRef idx="0">
-              <a:schemeClr val="accent1"/>
-            </a:effectRef>
-            <a:fontRef idx="minor">
-              <a:schemeClr val="tx1"/>
-            </a:fontRef>
-          </p:style>
-        </p:cxnSp>
-      </p:grpSp>
-      <p:grpSp>
-        <p:nvGrpSpPr>
-          <p:cNvPr id="24" name="Group 23"/>
-          <p:cNvGrpSpPr/>
-          <p:nvPr/>
-        </p:nvGrpSpPr>
-        <p:grpSpPr>
-          <a:xfrm>
-            <a:off x="2615669" y="792911"/>
-            <a:ext cx="152400" cy="76201"/>
-            <a:chOff x="3139472" y="1481137"/>
-            <a:chExt cx="152400" cy="76201"/>
-          </a:xfrm>
-        </p:grpSpPr>
-        <p:sp>
-          <p:nvSpPr>
-            <p:cNvPr id="18" name="Isosceles Triangle 17"/>
-            <p:cNvSpPr/>
-            <p:nvPr/>
-          </p:nvSpPr>
-          <p:spPr>
-            <a:xfrm rot="16200000">
-              <a:off x="3177572" y="1443037"/>
-              <a:ext cx="76200" cy="152400"/>
-            </a:xfrm>
-            <a:prstGeom prst="triangle">
-              <a:avLst/>
-            </a:prstGeom>
-            <a:solidFill>
-              <a:schemeClr val="bg1"/>
-            </a:solidFill>
-            <a:ln w="15875">
-              <a:noFill/>
-            </a:ln>
-          </p:spPr>
-          <p:style>
-            <a:lnRef idx="2">
-              <a:schemeClr val="accent1">
-                <a:shade val="50000"/>
-              </a:schemeClr>
-            </a:lnRef>
-            <a:fillRef idx="1">
-              <a:schemeClr val="accent1"/>
-            </a:fillRef>
-            <a:effectRef idx="0">
-              <a:schemeClr val="accent1"/>
-            </a:effectRef>
-            <a:fontRef idx="minor">
-              <a:schemeClr val="lt1"/>
-            </a:fontRef>
-          </p:style>
-          <p:txBody>
-            <a:bodyPr rtlCol="0" anchor="ctr"/>
-            <a:lstStyle/>
-            <a:p>
-              <a:pPr algn="ctr"/>
-              <a:endParaRPr lang="en-US" dirty="0" smtClean="0">
-                <a:solidFill>
-                  <a:schemeClr val="tx1"/>
-                </a:solidFill>
-              </a:endParaRPr>
-            </a:p>
-          </p:txBody>
-        </p:sp>
-        <p:cxnSp>
-          <p:nvCxnSpPr>
-            <p:cNvPr id="20" name="Straight Connector 19"/>
-            <p:cNvCxnSpPr/>
-            <p:nvPr/>
-          </p:nvCxnSpPr>
-          <p:spPr>
-            <a:xfrm flipH="1">
-              <a:off x="3200400" y="1481137"/>
-              <a:ext cx="76200" cy="19050"/>
-            </a:xfrm>
-            <a:prstGeom prst="line">
-              <a:avLst/>
-            </a:prstGeom>
-            <a:ln w="19050">
-              <a:solidFill>
-                <a:schemeClr val="tx1"/>
-              </a:solidFill>
-              <a:headEnd type="none"/>
-              <a:tailEnd type="none"/>
-            </a:ln>
-          </p:spPr>
-          <p:style>
-            <a:lnRef idx="1">
-              <a:schemeClr val="accent1"/>
-            </a:lnRef>
-            <a:fillRef idx="0">
-              <a:schemeClr val="accent1"/>
-            </a:fillRef>
-            <a:effectRef idx="0">
-              <a:schemeClr val="accent1"/>
-            </a:effectRef>
-            <a:fontRef idx="minor">
-              <a:schemeClr val="tx1"/>
-            </a:fontRef>
-          </p:style>
-        </p:cxnSp>
-        <p:cxnSp>
-          <p:nvCxnSpPr>
-            <p:cNvPr id="21" name="Straight Connector 20"/>
-            <p:cNvCxnSpPr/>
-            <p:nvPr/>
-          </p:nvCxnSpPr>
-          <p:spPr>
-            <a:xfrm flipH="1" flipV="1">
-              <a:off x="3200400" y="1538287"/>
-              <a:ext cx="76200" cy="19051"/>
-            </a:xfrm>
-            <a:prstGeom prst="line">
-              <a:avLst/>
-            </a:prstGeom>
-            <a:ln w="19050">
-              <a:solidFill>
-                <a:schemeClr val="tx1"/>
-              </a:solidFill>
-              <a:headEnd type="none"/>
-              <a:tailEnd type="none"/>
-            </a:ln>
-          </p:spPr>
-          <p:style>
-            <a:lnRef idx="1">
-              <a:schemeClr val="accent1"/>
-            </a:lnRef>
-            <a:fillRef idx="0">
-              <a:schemeClr val="accent1"/>
-            </a:fillRef>
-            <a:effectRef idx="0">
-              <a:schemeClr val="accent1"/>
-            </a:effectRef>
-            <a:fontRef idx="minor">
-              <a:schemeClr val="tx1"/>
-            </a:fontRef>
-          </p:style>
-        </p:cxnSp>
-      </p:grpSp>
-      <p:sp>
-        <p:nvSpPr>
-          <p:cNvPr id="29" name="Isosceles Triangle 28"/>
-          <p:cNvSpPr/>
-          <p:nvPr/>
-        </p:nvSpPr>
-        <p:spPr>
-          <a:xfrm rot="5400000">
-            <a:off x="1385376" y="766725"/>
-            <a:ext cx="76200" cy="90487"/>
-          </a:xfrm>
-          <a:prstGeom prst="triangle">
-            <a:avLst/>
-          </a:prstGeom>
-          <a:noFill/>
-          <a:ln w="15875">
-            <a:solidFill>
-              <a:schemeClr val="tx1"/>
-            </a:solidFill>
-          </a:ln>
-        </p:spPr>
-        <p:style>
-          <a:lnRef idx="2">
-            <a:schemeClr val="accent1">
-              <a:shade val="50000"/>
-            </a:schemeClr>
-          </a:lnRef>
-          <a:fillRef idx="1">
-            <a:schemeClr val="accent1"/>
-          </a:fillRef>
-          <a:effectRef idx="0">
-            <a:schemeClr val="accent1"/>
-          </a:effectRef>
-          <a:fontRef idx="minor">
-            <a:schemeClr val="lt1"/>
-          </a:fontRef>
-        </p:style>
-        <p:txBody>
-          <a:bodyPr rtlCol="0" anchor="ctr"/>
-          <a:lstStyle/>
-          <a:p>
-            <a:pPr algn="ctr"/>
-            <a:endParaRPr lang="en-US" dirty="0" smtClean="0">
-              <a:solidFill>
-                <a:schemeClr val="tx1"/>
-              </a:solidFill>
-            </a:endParaRPr>
-          </a:p>
-        </p:txBody>
-      </p:sp>
-      <p:sp>
-        <p:nvSpPr>
-          <p:cNvPr id="30" name="TextBox 29"/>
+          <p:cNvPr id="47" name="TextBox 46"/>
           <p:cNvSpPr txBox="1"/>
           <p:nvPr/>
         </p:nvSpPr>
         <p:spPr>
           <a:xfrm>
-            <a:off x="1846985" y="250306"/>
-            <a:ext cx="558166" cy="261610"/>
+            <a:off x="3194637" y="3105388"/>
+            <a:ext cx="996363" cy="646331"/>
           </a:xfrm>
           <a:prstGeom prst="rect">
             <a:avLst/>
@@ -10170,531 +9440,20 @@
           <a:lstStyle/>
           <a:p>
             <a:r>
-              <a:rPr lang="en-US" sz="1100" i="1" dirty="0" smtClean="0"/>
-              <a:t>source</a:t>
-            </a:r>
-            <a:endParaRPr lang="en-US" i="1" dirty="0"/>
-          </a:p>
-        </p:txBody>
-      </p:sp>
-      <p:sp>
-        <p:nvSpPr>
-          <p:cNvPr id="31" name="TextBox 30"/>
-          <p:cNvSpPr txBox="1"/>
-          <p:nvPr/>
-        </p:nvSpPr>
-        <p:spPr>
-          <a:xfrm>
-            <a:off x="2799412" y="258802"/>
-            <a:ext cx="530915" cy="261610"/>
-          </a:xfrm>
-          <a:prstGeom prst="rect">
-            <a:avLst/>
-          </a:prstGeom>
-          <a:noFill/>
-        </p:spPr>
-        <p:txBody>
-          <a:bodyPr wrap="none" rtlCol="0">
-            <a:spAutoFit/>
-          </a:bodyPr>
-          <a:lstStyle/>
-          <a:p>
-            <a:r>
-              <a:rPr lang="en-US" sz="1100" i="1" dirty="0" smtClean="0"/>
-              <a:t>buffer</a:t>
-            </a:r>
-            <a:endParaRPr lang="en-US" i="1" dirty="0"/>
-          </a:p>
-        </p:txBody>
-      </p:sp>
-      <p:sp>
-        <p:nvSpPr>
-          <p:cNvPr id="32" name="TextBox 31"/>
-          <p:cNvSpPr txBox="1"/>
-          <p:nvPr/>
-        </p:nvSpPr>
-        <p:spPr>
-          <a:xfrm>
-            <a:off x="4462467" y="55053"/>
-            <a:ext cx="473206" cy="261610"/>
-          </a:xfrm>
-          <a:prstGeom prst="rect">
-            <a:avLst/>
-          </a:prstGeom>
-          <a:noFill/>
-        </p:spPr>
-        <p:txBody>
-          <a:bodyPr wrap="none" rtlCol="0">
-            <a:spAutoFit/>
-          </a:bodyPr>
-          <a:lstStyle/>
-          <a:p>
-            <a:r>
-              <a:rPr lang="en-US" sz="1100" i="1" dirty="0" smtClean="0"/>
-              <a:t>main</a:t>
-            </a:r>
-            <a:endParaRPr lang="en-US" i="1" dirty="0"/>
-          </a:p>
-        </p:txBody>
-      </p:sp>
-      <p:grpSp>
-        <p:nvGrpSpPr>
-          <p:cNvPr id="35" name="Group 34"/>
-          <p:cNvGrpSpPr/>
-          <p:nvPr/>
-        </p:nvGrpSpPr>
-        <p:grpSpPr>
-          <a:xfrm>
-            <a:off x="5529197" y="788149"/>
-            <a:ext cx="587824" cy="114300"/>
-            <a:chOff x="6365294" y="1462086"/>
-            <a:chExt cx="587824" cy="114300"/>
-          </a:xfrm>
-        </p:grpSpPr>
-        <p:sp>
-          <p:nvSpPr>
-            <p:cNvPr id="33" name="Rectangle 32"/>
-            <p:cNvSpPr/>
-            <p:nvPr/>
-          </p:nvSpPr>
-          <p:spPr>
-            <a:xfrm>
-              <a:off x="6551097" y="1462086"/>
-              <a:ext cx="402021" cy="114300"/>
-            </a:xfrm>
-            <a:prstGeom prst="rect">
-              <a:avLst/>
-            </a:prstGeom>
-            <a:noFill/>
-            <a:ln w="15875">
-              <a:solidFill>
-                <a:schemeClr val="tx1"/>
-              </a:solidFill>
-            </a:ln>
-          </p:spPr>
-          <p:style>
-            <a:lnRef idx="2">
-              <a:schemeClr val="accent1">
-                <a:shade val="50000"/>
-              </a:schemeClr>
-            </a:lnRef>
-            <a:fillRef idx="1">
-              <a:schemeClr val="accent1"/>
-            </a:fillRef>
-            <a:effectRef idx="0">
-              <a:schemeClr val="accent1"/>
-            </a:effectRef>
-            <a:fontRef idx="minor">
-              <a:schemeClr val="lt1"/>
-            </a:fontRef>
-          </p:style>
-          <p:txBody>
-            <a:bodyPr rtlCol="0" anchor="ctr"/>
-            <a:lstStyle/>
-            <a:p>
-              <a:pPr algn="ctr"/>
-              <a:endParaRPr lang="en-US" dirty="0" smtClean="0">
-                <a:solidFill>
-                  <a:schemeClr val="tx1"/>
-                </a:solidFill>
-              </a:endParaRPr>
-            </a:p>
-          </p:txBody>
-        </p:sp>
-        <p:sp>
-          <p:nvSpPr>
-            <p:cNvPr id="34" name="Rectangle 33"/>
-            <p:cNvSpPr/>
-            <p:nvPr/>
-          </p:nvSpPr>
-          <p:spPr>
-            <a:xfrm>
-              <a:off x="6365294" y="1481136"/>
-              <a:ext cx="402021" cy="76199"/>
-            </a:xfrm>
-            <a:prstGeom prst="rect">
-              <a:avLst/>
-            </a:prstGeom>
-            <a:solidFill>
-              <a:schemeClr val="bg1"/>
-            </a:solidFill>
-            <a:ln w="15875">
-              <a:noFill/>
-            </a:ln>
-          </p:spPr>
-          <p:style>
-            <a:lnRef idx="2">
-              <a:schemeClr val="accent1">
-                <a:shade val="50000"/>
-              </a:schemeClr>
-            </a:lnRef>
-            <a:fillRef idx="1">
-              <a:schemeClr val="accent1"/>
-            </a:fillRef>
-            <a:effectRef idx="0">
-              <a:schemeClr val="accent1"/>
-            </a:effectRef>
-            <a:fontRef idx="minor">
-              <a:schemeClr val="lt1"/>
-            </a:fontRef>
-          </p:style>
-          <p:txBody>
-            <a:bodyPr rtlCol="0" anchor="ctr"/>
-            <a:lstStyle/>
-            <a:p>
-              <a:pPr algn="ctr"/>
-              <a:endParaRPr lang="en-US" dirty="0" smtClean="0">
-                <a:solidFill>
-                  <a:schemeClr val="tx1"/>
-                </a:solidFill>
-              </a:endParaRPr>
-            </a:p>
-          </p:txBody>
-        </p:sp>
-      </p:grpSp>
-      <p:sp>
-        <p:nvSpPr>
-          <p:cNvPr id="39" name="TextBox 38"/>
-          <p:cNvSpPr txBox="1"/>
-          <p:nvPr/>
-        </p:nvSpPr>
-        <p:spPr>
-          <a:xfrm>
-            <a:off x="3400281" y="869848"/>
-            <a:ext cx="292388" cy="618118"/>
-          </a:xfrm>
-          <a:prstGeom prst="rect">
-            <a:avLst/>
-          </a:prstGeom>
-          <a:noFill/>
-        </p:spPr>
-        <p:txBody>
-          <a:bodyPr vert="vert270" wrap="none" rtlCol="0">
-            <a:spAutoFit/>
-          </a:bodyPr>
-          <a:lstStyle/>
-          <a:p>
-            <a:r>
-              <a:rPr lang="en-US" sz="700" i="1" dirty="0" smtClean="0"/>
-              <a:t>isolation valve</a:t>
-            </a:r>
-            <a:endParaRPr lang="en-US" i="1" dirty="0"/>
-          </a:p>
-        </p:txBody>
-      </p:sp>
-      <p:cxnSp>
-        <p:nvCxnSpPr>
-          <p:cNvPr id="48" name="Straight Connector 47"/>
-          <p:cNvCxnSpPr>
-            <a:endCxn id="50" idx="1"/>
-          </p:cNvCxnSpPr>
-          <p:nvPr/>
-        </p:nvCxnSpPr>
-        <p:spPr>
-          <a:xfrm>
-            <a:off x="4116903" y="88063"/>
-            <a:ext cx="0" cy="776296"/>
-          </a:xfrm>
-          <a:prstGeom prst="line">
-            <a:avLst/>
-          </a:prstGeom>
-          <a:ln w="19050">
-            <a:solidFill>
-              <a:schemeClr val="tx1"/>
-            </a:solidFill>
-            <a:headEnd type="none"/>
-            <a:tailEnd type="none"/>
-          </a:ln>
-        </p:spPr>
-        <p:style>
-          <a:lnRef idx="1">
-            <a:schemeClr val="accent1"/>
-          </a:lnRef>
-          <a:fillRef idx="0">
-            <a:schemeClr val="accent1"/>
-          </a:fillRef>
-          <a:effectRef idx="0">
-            <a:schemeClr val="accent1"/>
-          </a:effectRef>
-          <a:fontRef idx="minor">
-            <a:schemeClr val="tx1"/>
-          </a:fontRef>
-        </p:style>
-      </p:cxnSp>
-      <p:cxnSp>
-        <p:nvCxnSpPr>
-          <p:cNvPr id="49" name="Straight Connector 48"/>
-          <p:cNvCxnSpPr>
-            <a:endCxn id="50" idx="3"/>
-          </p:cNvCxnSpPr>
-          <p:nvPr/>
-        </p:nvCxnSpPr>
-        <p:spPr>
-          <a:xfrm>
-            <a:off x="4193103" y="88062"/>
-            <a:ext cx="0" cy="776297"/>
-          </a:xfrm>
-          <a:prstGeom prst="line">
-            <a:avLst/>
-          </a:prstGeom>
-          <a:ln w="19050">
-            <a:solidFill>
-              <a:schemeClr val="tx1"/>
-            </a:solidFill>
-            <a:headEnd type="none"/>
-            <a:tailEnd type="none"/>
-          </a:ln>
-        </p:spPr>
-        <p:style>
-          <a:lnRef idx="1">
-            <a:schemeClr val="accent1"/>
-          </a:lnRef>
-          <a:fillRef idx="0">
-            <a:schemeClr val="accent1"/>
-          </a:fillRef>
-          <a:effectRef idx="0">
-            <a:schemeClr val="accent1"/>
-          </a:effectRef>
-          <a:fontRef idx="minor">
-            <a:schemeClr val="tx1"/>
-          </a:fontRef>
-        </p:style>
-      </p:cxnSp>
-      <p:sp>
-        <p:nvSpPr>
-          <p:cNvPr id="50" name="Rectangle 49"/>
-          <p:cNvSpPr/>
-          <p:nvPr/>
-        </p:nvSpPr>
-        <p:spPr>
-          <a:xfrm>
-            <a:off x="4116903" y="831010"/>
-            <a:ext cx="76200" cy="66698"/>
-          </a:xfrm>
-          <a:prstGeom prst="rect">
-            <a:avLst/>
-          </a:prstGeom>
-          <a:noFill/>
-          <a:ln w="15875">
-            <a:solidFill>
-              <a:schemeClr val="tx1"/>
-            </a:solidFill>
-          </a:ln>
-        </p:spPr>
-        <p:style>
-          <a:lnRef idx="2">
-            <a:schemeClr val="accent1">
-              <a:shade val="50000"/>
-            </a:schemeClr>
-          </a:lnRef>
-          <a:fillRef idx="1">
-            <a:schemeClr val="accent1"/>
-          </a:fillRef>
-          <a:effectRef idx="0">
-            <a:schemeClr val="accent1"/>
-          </a:effectRef>
-          <a:fontRef idx="minor">
-            <a:schemeClr val="lt1"/>
-          </a:fontRef>
-        </p:style>
-        <p:txBody>
-          <a:bodyPr rtlCol="0" anchor="ctr"/>
-          <a:lstStyle/>
-          <a:p>
-            <a:pPr algn="ctr"/>
-            <a:endParaRPr lang="en-US" dirty="0" smtClean="0">
-              <a:solidFill>
-                <a:schemeClr val="tx1"/>
-              </a:solidFill>
-            </a:endParaRPr>
-          </a:p>
-        </p:txBody>
-      </p:sp>
-      <p:sp>
-        <p:nvSpPr>
-          <p:cNvPr id="42" name="Rectangle 41"/>
-          <p:cNvSpPr/>
-          <p:nvPr/>
-        </p:nvSpPr>
-        <p:spPr>
-          <a:xfrm>
-            <a:off x="1765733" y="1296287"/>
-            <a:ext cx="609600" cy="1306375"/>
-          </a:xfrm>
-          <a:prstGeom prst="rect">
-            <a:avLst/>
-          </a:prstGeom>
-          <a:noFill/>
-          <a:ln w="15875">
-            <a:solidFill>
-              <a:schemeClr val="tx1"/>
-            </a:solidFill>
-          </a:ln>
-        </p:spPr>
-        <p:style>
-          <a:lnRef idx="2">
-            <a:schemeClr val="accent1">
-              <a:shade val="50000"/>
-            </a:schemeClr>
-          </a:lnRef>
-          <a:fillRef idx="1">
-            <a:schemeClr val="accent1"/>
-          </a:fillRef>
-          <a:effectRef idx="0">
-            <a:schemeClr val="accent1"/>
-          </a:effectRef>
-          <a:fontRef idx="minor">
-            <a:schemeClr val="lt1"/>
-          </a:fontRef>
-        </p:style>
-        <p:txBody>
-          <a:bodyPr rtlCol="0" anchor="ctr"/>
-          <a:lstStyle/>
-          <a:p>
-            <a:pPr algn="ctr"/>
-            <a:endParaRPr lang="en-US" dirty="0" smtClean="0">
-              <a:solidFill>
-                <a:schemeClr val="tx1"/>
-              </a:solidFill>
-            </a:endParaRPr>
-          </a:p>
-        </p:txBody>
-      </p:sp>
-      <p:sp>
-        <p:nvSpPr>
-          <p:cNvPr id="45" name="TextBox 44"/>
-          <p:cNvSpPr txBox="1"/>
-          <p:nvPr/>
-        </p:nvSpPr>
-        <p:spPr>
-          <a:xfrm>
-            <a:off x="1814432" y="1276061"/>
-            <a:ext cx="558166" cy="461665"/>
-          </a:xfrm>
-          <a:prstGeom prst="rect">
-            <a:avLst/>
-          </a:prstGeom>
-          <a:noFill/>
-        </p:spPr>
-        <p:txBody>
-          <a:bodyPr wrap="none" rtlCol="0">
-            <a:spAutoFit/>
-          </a:bodyPr>
-          <a:lstStyle/>
-          <a:p>
-            <a:r>
-              <a:rPr lang="en-US" sz="800" i="1" dirty="0" smtClean="0"/>
-              <a:t>diffusion</a:t>
-            </a:r>
-          </a:p>
-          <a:p>
-            <a:r>
-              <a:rPr lang="en-US" sz="800" i="1" dirty="0" smtClean="0"/>
+              <a:rPr lang="en-US" i="1" dirty="0"/>
+              <a:t>d</a:t>
+            </a:r>
+            <a:r>
+              <a:rPr lang="en-US" i="1" dirty="0" smtClean="0"/>
+              <a:t>iffusion</a:t>
+            </a:r>
+          </a:p>
+          <a:p>
+            <a:r>
+              <a:rPr lang="en-US" i="1" dirty="0" smtClean="0"/>
               <a:t>pump</a:t>
             </a:r>
-          </a:p>
-          <a:p>
-            <a:r>
-              <a:rPr lang="en-US" sz="800" i="1" dirty="0" smtClean="0"/>
-              <a:t>(HS-10)</a:t>
-            </a:r>
-            <a:endParaRPr lang="en-US" sz="800" i="1" dirty="0"/>
-          </a:p>
-        </p:txBody>
-      </p:sp>
-      <p:sp>
-        <p:nvSpPr>
-          <p:cNvPr id="46" name="Rectangle 45"/>
-          <p:cNvSpPr/>
-          <p:nvPr/>
-        </p:nvSpPr>
-        <p:spPr>
-          <a:xfrm>
-            <a:off x="2851733" y="1296287"/>
-            <a:ext cx="422168" cy="849176"/>
-          </a:xfrm>
-          <a:prstGeom prst="rect">
-            <a:avLst/>
-          </a:prstGeom>
-          <a:noFill/>
-          <a:ln w="15875">
-            <a:solidFill>
-              <a:schemeClr val="tx1"/>
-            </a:solidFill>
-          </a:ln>
-        </p:spPr>
-        <p:style>
-          <a:lnRef idx="2">
-            <a:schemeClr val="accent1">
-              <a:shade val="50000"/>
-            </a:schemeClr>
-          </a:lnRef>
-          <a:fillRef idx="1">
-            <a:schemeClr val="accent1"/>
-          </a:fillRef>
-          <a:effectRef idx="0">
-            <a:schemeClr val="accent1"/>
-          </a:effectRef>
-          <a:fontRef idx="minor">
-            <a:schemeClr val="lt1"/>
-          </a:fontRef>
-        </p:style>
-        <p:txBody>
-          <a:bodyPr rtlCol="0" anchor="ctr"/>
-          <a:lstStyle/>
-          <a:p>
-            <a:pPr algn="ctr"/>
-            <a:endParaRPr lang="en-US" dirty="0" smtClean="0">
-              <a:solidFill>
-                <a:schemeClr val="tx1"/>
-              </a:solidFill>
-            </a:endParaRPr>
-          </a:p>
-        </p:txBody>
-      </p:sp>
-      <p:sp>
-        <p:nvSpPr>
-          <p:cNvPr id="47" name="TextBox 46"/>
-          <p:cNvSpPr txBox="1"/>
-          <p:nvPr/>
-        </p:nvSpPr>
-        <p:spPr>
-          <a:xfrm>
-            <a:off x="2794802" y="1276062"/>
-            <a:ext cx="548548" cy="461665"/>
-          </a:xfrm>
-          <a:prstGeom prst="rect">
-            <a:avLst/>
-          </a:prstGeom>
-          <a:noFill/>
-        </p:spPr>
-        <p:txBody>
-          <a:bodyPr wrap="none" rtlCol="0">
-            <a:spAutoFit/>
-          </a:bodyPr>
-          <a:lstStyle/>
-          <a:p>
-            <a:r>
-              <a:rPr lang="en-US" sz="800" i="1" dirty="0"/>
-              <a:t>d</a:t>
-            </a:r>
-            <a:r>
-              <a:rPr lang="en-US" sz="800" i="1" dirty="0" smtClean="0"/>
-              <a:t>iffusion</a:t>
-            </a:r>
-          </a:p>
-          <a:p>
-            <a:r>
-              <a:rPr lang="en-US" sz="800" i="1" dirty="0" smtClean="0"/>
-              <a:t>pump</a:t>
-            </a:r>
-          </a:p>
-          <a:p>
-            <a:r>
-              <a:rPr lang="en-US" sz="800" i="1" dirty="0" smtClean="0"/>
-              <a:t>(VHS-6)</a:t>
-            </a:r>
-            <a:endParaRPr lang="en-US" sz="800" i="1" dirty="0"/>
+            <a:endParaRPr lang="en-US" i="1" dirty="0" smtClean="0"/>
           </a:p>
         </p:txBody>
       </p:sp>
@@ -10706,8 +9465,8 @@
         </p:nvCxnSpPr>
         <p:spPr>
           <a:xfrm>
-            <a:off x="3050103" y="2145463"/>
-            <a:ext cx="0" cy="762000"/>
+            <a:off x="3733800" y="4070993"/>
+            <a:ext cx="0" cy="1796406"/>
           </a:xfrm>
           <a:prstGeom prst="line">
             <a:avLst/>
@@ -10738,13 +9497,15 @@
       <p:cxnSp>
         <p:nvCxnSpPr>
           <p:cNvPr id="51" name="Straight Connector 50"/>
-          <p:cNvCxnSpPr/>
+          <p:cNvCxnSpPr>
+            <a:stCxn id="42" idx="2"/>
+          </p:cNvCxnSpPr>
           <p:nvPr/>
         </p:nvCxnSpPr>
         <p:spPr>
           <a:xfrm>
-            <a:off x="2059503" y="2602663"/>
-            <a:ext cx="0" cy="304800"/>
+            <a:off x="2011203" y="4399754"/>
+            <a:ext cx="0" cy="1467645"/>
           </a:xfrm>
           <a:prstGeom prst="line">
             <a:avLst/>
@@ -10775,50 +9536,15 @@
       <p:cxnSp>
         <p:nvCxnSpPr>
           <p:cNvPr id="52" name="Straight Connector 51"/>
-          <p:cNvCxnSpPr/>
+          <p:cNvCxnSpPr>
+            <a:endCxn id="57" idx="3"/>
+          </p:cNvCxnSpPr>
           <p:nvPr/>
         </p:nvCxnSpPr>
         <p:spPr>
           <a:xfrm flipH="1">
-            <a:off x="1526103" y="2907463"/>
-            <a:ext cx="1531494" cy="0"/>
-          </a:xfrm>
-          <a:prstGeom prst="line">
-            <a:avLst/>
-          </a:prstGeom>
-          <a:ln w="19050">
-            <a:solidFill>
-              <a:schemeClr val="tx1"/>
-            </a:solidFill>
-            <a:headEnd type="none"/>
-            <a:tailEnd type="none"/>
-          </a:ln>
-        </p:spPr>
-        <p:style>
-          <a:lnRef idx="1">
-            <a:schemeClr val="accent1"/>
-          </a:lnRef>
-          <a:fillRef idx="0">
-            <a:schemeClr val="accent1"/>
-          </a:fillRef>
-          <a:effectRef idx="0">
-            <a:schemeClr val="accent1"/>
-          </a:effectRef>
-          <a:fontRef idx="minor">
-            <a:schemeClr val="tx1"/>
-          </a:fontRef>
-        </p:style>
-      </p:cxnSp>
-      <p:cxnSp>
-        <p:nvCxnSpPr>
-          <p:cNvPr id="54" name="Straight Connector 53"/>
-          <p:cNvCxnSpPr/>
-          <p:nvPr/>
-        </p:nvCxnSpPr>
-        <p:spPr>
-          <a:xfrm flipH="1">
-            <a:off x="731518" y="2907463"/>
-            <a:ext cx="457200" cy="0"/>
+            <a:off x="1785152" y="5867400"/>
+            <a:ext cx="1948649" cy="0"/>
           </a:xfrm>
           <a:prstGeom prst="line">
             <a:avLst/>
@@ -10854,7 +9580,7 @@
         </p:nvGrpSpPr>
         <p:grpSpPr>
           <a:xfrm rot="5400000">
-            <a:off x="1226818" y="2678863"/>
+            <a:off x="1522393" y="5638799"/>
             <a:ext cx="228600" cy="381000"/>
             <a:chOff x="2438400" y="3082158"/>
             <a:chExt cx="228600" cy="381000"/>
@@ -11084,14 +9810,14 @@
         </p:nvSpPr>
         <p:spPr>
           <a:xfrm>
-            <a:off x="42599" y="2676630"/>
-            <a:ext cx="687564" cy="461665"/>
+            <a:off x="193828" y="5257465"/>
+            <a:ext cx="1252167" cy="840768"/>
           </a:xfrm>
           <a:prstGeom prst="rect">
             <a:avLst/>
           </a:prstGeom>
           <a:noFill/>
-          <a:ln w="15875">
+          <a:ln w="19050">
             <a:solidFill>
               <a:schemeClr val="tx1"/>
             </a:solidFill>
@@ -11134,8 +9860,8 @@
         </p:nvSpPr>
         <p:spPr>
           <a:xfrm>
-            <a:off x="95275" y="2676630"/>
-            <a:ext cx="561372" cy="461665"/>
+            <a:off x="170356" y="5207168"/>
+            <a:ext cx="1120820" cy="1015663"/>
           </a:xfrm>
           <a:prstGeom prst="rect">
             <a:avLst/>
@@ -11149,22 +9875,22 @@
           <a:lstStyle/>
           <a:p>
             <a:r>
-              <a:rPr lang="en-US" sz="800" i="1" dirty="0"/>
+              <a:rPr lang="en-US" sz="2000" i="1" dirty="0"/>
               <a:t>r</a:t>
             </a:r>
             <a:r>
-              <a:rPr lang="en-US" sz="800" i="1" dirty="0" smtClean="0"/>
+              <a:rPr lang="en-US" sz="2000" i="1" dirty="0" smtClean="0"/>
               <a:t>oughing</a:t>
             </a:r>
           </a:p>
           <a:p>
             <a:r>
-              <a:rPr lang="en-US" sz="800" i="1" dirty="0" smtClean="0"/>
+              <a:rPr lang="en-US" sz="2000" i="1" dirty="0" smtClean="0"/>
               <a:t>pump 1</a:t>
             </a:r>
           </a:p>
           <a:p>
-            <a:endParaRPr lang="en-US" sz="800" i="1" dirty="0"/>
+            <a:endParaRPr lang="en-US" sz="2000" i="1" dirty="0"/>
           </a:p>
         </p:txBody>
       </p:sp>
@@ -11176,8 +9902,8 @@
         </p:nvCxnSpPr>
         <p:spPr>
           <a:xfrm>
-            <a:off x="4806933" y="1988299"/>
-            <a:ext cx="0" cy="919164"/>
+            <a:off x="5802602" y="3650487"/>
+            <a:ext cx="0" cy="1329931"/>
           </a:xfrm>
           <a:prstGeom prst="line">
             <a:avLst/>
@@ -11208,15 +9934,13 @@
       <p:cxnSp>
         <p:nvCxnSpPr>
           <p:cNvPr id="66" name="Straight Connector 65"/>
-          <p:cNvCxnSpPr>
-            <a:endCxn id="73" idx="3"/>
-          </p:cNvCxnSpPr>
+          <p:cNvCxnSpPr/>
           <p:nvPr/>
         </p:nvCxnSpPr>
         <p:spPr>
-          <a:xfrm flipH="1" flipV="1">
-            <a:off x="4623158" y="2907464"/>
-            <a:ext cx="184835" cy="1438"/>
+          <a:xfrm flipH="1">
+            <a:off x="5812662" y="3869721"/>
+            <a:ext cx="645942" cy="0"/>
           </a:xfrm>
           <a:prstGeom prst="line">
             <a:avLst/>
@@ -11252,7 +9976,7 @@
         </p:nvGrpSpPr>
         <p:grpSpPr>
           <a:xfrm>
-            <a:off x="4654533" y="1612063"/>
+            <a:off x="5650202" y="3293472"/>
             <a:ext cx="228600" cy="381000"/>
             <a:chOff x="2438400" y="3082158"/>
             <a:chExt cx="228600" cy="381000"/>
@@ -11476,93 +10200,50 @@
       </p:grpSp>
       <p:sp>
         <p:nvSpPr>
-          <p:cNvPr id="73" name="Rectangle 72"/>
-          <p:cNvSpPr/>
-          <p:nvPr/>
-        </p:nvSpPr>
-        <p:spPr>
-          <a:xfrm>
-            <a:off x="3935594" y="2676631"/>
-            <a:ext cx="687564" cy="461665"/>
-          </a:xfrm>
-          <a:prstGeom prst="rect">
-            <a:avLst/>
-          </a:prstGeom>
-          <a:noFill/>
-          <a:ln w="15875">
-            <a:solidFill>
-              <a:schemeClr val="tx1"/>
-            </a:solidFill>
-          </a:ln>
-        </p:spPr>
-        <p:style>
-          <a:lnRef idx="2">
-            <a:schemeClr val="accent1">
-              <a:shade val="50000"/>
-            </a:schemeClr>
-          </a:lnRef>
-          <a:fillRef idx="1">
-            <a:schemeClr val="accent1"/>
-          </a:fillRef>
-          <a:effectRef idx="0">
-            <a:schemeClr val="accent1"/>
-          </a:effectRef>
-          <a:fontRef idx="minor">
-            <a:schemeClr val="lt1"/>
-          </a:fontRef>
-        </p:style>
-        <p:txBody>
-          <a:bodyPr rtlCol="0" anchor="ctr"/>
-          <a:lstStyle/>
-          <a:p>
-            <a:pPr algn="ctr"/>
-            <a:endParaRPr lang="en-US" dirty="0" smtClean="0">
-              <a:solidFill>
-                <a:schemeClr val="tx1"/>
-              </a:solidFill>
-            </a:endParaRPr>
-          </a:p>
-        </p:txBody>
-      </p:sp>
-      <p:sp>
-        <p:nvSpPr>
           <p:cNvPr id="74" name="TextBox 73"/>
           <p:cNvSpPr txBox="1"/>
           <p:nvPr/>
         </p:nvSpPr>
         <p:spPr>
           <a:xfrm>
-            <a:off x="3980623" y="2676630"/>
-            <a:ext cx="561372" cy="461665"/>
+            <a:off x="5310359" y="4980417"/>
+            <a:ext cx="1328235" cy="886982"/>
           </a:xfrm>
           <a:prstGeom prst="rect">
             <a:avLst/>
           </a:prstGeom>
           <a:noFill/>
-        </p:spPr>
-        <p:txBody>
-          <a:bodyPr wrap="none" rtlCol="0">
-            <a:spAutoFit/>
+          <a:ln w="19050">
+            <a:solidFill>
+              <a:schemeClr val="tx1"/>
+            </a:solidFill>
+          </a:ln>
+        </p:spPr>
+        <p:txBody>
+          <a:bodyPr wrap="square" rtlCol="0">
+            <a:noAutofit/>
           </a:bodyPr>
           <a:lstStyle/>
           <a:p>
             <a:r>
-              <a:rPr lang="en-US" sz="800" i="1" dirty="0"/>
+              <a:rPr lang="en-US" sz="2000" i="1" dirty="0"/>
               <a:t>r</a:t>
             </a:r>
             <a:r>
-              <a:rPr lang="en-US" sz="800" i="1" dirty="0" smtClean="0"/>
+              <a:rPr lang="en-US" sz="2000" i="1" dirty="0" smtClean="0"/>
               <a:t>oughing</a:t>
             </a:r>
           </a:p>
           <a:p>
             <a:r>
-              <a:rPr lang="en-US" sz="800" i="1" dirty="0" smtClean="0"/>
-              <a:t>pump 2</a:t>
-            </a:r>
-          </a:p>
-          <a:p>
-            <a:endParaRPr lang="en-US" sz="800" i="1" dirty="0"/>
+              <a:rPr lang="en-US" sz="2000" i="1" dirty="0" smtClean="0"/>
+              <a:t>pump </a:t>
+            </a:r>
+            <a:r>
+              <a:rPr lang="en-US" sz="2000" i="1" dirty="0" smtClean="0"/>
+              <a:t>2</a:t>
+            </a:r>
+            <a:endParaRPr lang="en-US" sz="2000" i="1" dirty="0" smtClean="0"/>
           </a:p>
         </p:txBody>
       </p:sp>
@@ -11574,7 +10255,7 @@
         </p:nvGrpSpPr>
         <p:grpSpPr>
           <a:xfrm rot="5400000">
-            <a:off x="4911813" y="1885792"/>
+            <a:off x="6556925" y="3611004"/>
             <a:ext cx="228600" cy="438359"/>
             <a:chOff x="2438400" y="3082158"/>
             <a:chExt cx="228600" cy="438359"/>
@@ -11798,93 +10479,36 @@
       </p:grpSp>
       <p:sp>
         <p:nvSpPr>
-          <p:cNvPr id="82" name="Rectangle 81"/>
-          <p:cNvSpPr/>
-          <p:nvPr/>
-        </p:nvSpPr>
-        <p:spPr>
-          <a:xfrm>
-            <a:off x="5238881" y="1997914"/>
-            <a:ext cx="529585" cy="290357"/>
-          </a:xfrm>
-          <a:prstGeom prst="rect">
-            <a:avLst/>
-          </a:prstGeom>
-          <a:noFill/>
-          <a:ln w="15875">
-            <a:solidFill>
-              <a:schemeClr val="tx1"/>
-            </a:solidFill>
-          </a:ln>
-        </p:spPr>
-        <p:style>
-          <a:lnRef idx="2">
-            <a:schemeClr val="accent1">
-              <a:shade val="50000"/>
-            </a:schemeClr>
-          </a:lnRef>
-          <a:fillRef idx="1">
-            <a:schemeClr val="accent1"/>
-          </a:fillRef>
-          <a:effectRef idx="0">
-            <a:schemeClr val="accent1"/>
-          </a:effectRef>
-          <a:fontRef idx="minor">
-            <a:schemeClr val="lt1"/>
-          </a:fontRef>
-        </p:style>
-        <p:txBody>
-          <a:bodyPr rtlCol="0" anchor="ctr"/>
-          <a:lstStyle/>
-          <a:p>
-            <a:pPr algn="ctr"/>
-            <a:endParaRPr lang="en-US" dirty="0" smtClean="0">
-              <a:solidFill>
-                <a:schemeClr val="tx1"/>
-              </a:solidFill>
-            </a:endParaRPr>
-          </a:p>
-        </p:txBody>
-      </p:sp>
-      <p:sp>
-        <p:nvSpPr>
           <p:cNvPr id="83" name="TextBox 82"/>
           <p:cNvSpPr txBox="1"/>
           <p:nvPr/>
         </p:nvSpPr>
         <p:spPr>
           <a:xfrm>
-            <a:off x="5302651" y="1971632"/>
-            <a:ext cx="425116" cy="461665"/>
+            <a:off x="6890405" y="3673172"/>
+            <a:ext cx="1341384" cy="369332"/>
           </a:xfrm>
           <a:prstGeom prst="rect">
             <a:avLst/>
           </a:prstGeom>
           <a:noFill/>
-        </p:spPr>
-        <p:txBody>
-          <a:bodyPr wrap="none" rtlCol="0">
+          <a:ln w="19050">
+            <a:solidFill>
+              <a:schemeClr val="tx1"/>
+            </a:solidFill>
+          </a:ln>
+        </p:spPr>
+        <p:txBody>
+          <a:bodyPr wrap="square" rtlCol="0">
             <a:spAutoFit/>
           </a:bodyPr>
           <a:lstStyle/>
           <a:p>
             <a:r>
-              <a:rPr lang="en-US" sz="800" i="1" dirty="0"/>
-              <a:t>t</a:t>
-            </a:r>
-            <a:r>
-              <a:rPr lang="en-US" sz="800" i="1" dirty="0" smtClean="0"/>
-              <a:t>urbo</a:t>
-            </a:r>
-          </a:p>
-          <a:p>
-            <a:r>
-              <a:rPr lang="en-US" sz="800" i="1" dirty="0" smtClean="0"/>
-              <a:t>pump</a:t>
-            </a:r>
-          </a:p>
-          <a:p>
-            <a:endParaRPr lang="en-US" sz="800" i="1" dirty="0"/>
+              <a:rPr lang="en-US" i="1" dirty="0" smtClean="0"/>
+              <a:t>turbo pump</a:t>
+            </a:r>
+            <a:endParaRPr lang="en-US" i="1" dirty="0" smtClean="0"/>
           </a:p>
         </p:txBody>
       </p:sp>
@@ -11896,7 +10520,7 @@
         </p:nvGrpSpPr>
         <p:grpSpPr>
           <a:xfrm>
-            <a:off x="5351274" y="1612063"/>
+            <a:off x="7418181" y="3293471"/>
             <a:ext cx="228600" cy="381000"/>
             <a:chOff x="2438400" y="3082158"/>
             <a:chExt cx="228600" cy="381000"/>
@@ -12126,8 +10750,8 @@
         </p:nvSpPr>
         <p:spPr>
           <a:xfrm>
-            <a:off x="4052739" y="1675564"/>
-            <a:ext cx="646331" cy="200055"/>
+            <a:off x="5812662" y="3314492"/>
+            <a:ext cx="825932" cy="369332"/>
           </a:xfrm>
           <a:prstGeom prst="rect">
             <a:avLst/>
@@ -12141,10 +10765,9 @@
           <a:lstStyle/>
           <a:p>
             <a:r>
-              <a:rPr lang="en-US" sz="700" i="1" dirty="0" smtClean="0"/>
-              <a:t>bypass valve</a:t>
-            </a:r>
-            <a:endParaRPr lang="en-US" i="1" dirty="0"/>
+              <a:rPr lang="en-US" i="1" dirty="0" smtClean="0"/>
+              <a:t>bypass</a:t>
+            </a:r>
           </a:p>
         </p:txBody>
       </p:sp>
@@ -12156,8 +10779,8 @@
         </p:nvSpPr>
         <p:spPr>
           <a:xfrm>
-            <a:off x="5538367" y="1684691"/>
-            <a:ext cx="562975" cy="200055"/>
+            <a:off x="7629253" y="3268255"/>
+            <a:ext cx="606961" cy="369332"/>
           </a:xfrm>
           <a:prstGeom prst="rect">
             <a:avLst/>
@@ -12171,8 +10794,8 @@
           <a:lstStyle/>
           <a:p>
             <a:r>
-              <a:rPr lang="en-US" sz="700" i="1" dirty="0" smtClean="0"/>
-              <a:t>gate valve</a:t>
+              <a:rPr lang="en-US" i="1" dirty="0" smtClean="0"/>
+              <a:t>gate</a:t>
             </a:r>
             <a:endParaRPr lang="en-US" i="1" dirty="0"/>
           </a:p>
@@ -12186,7 +10809,7 @@
         </p:nvGrpSpPr>
         <p:grpSpPr>
           <a:xfrm rot="5400000">
-            <a:off x="5874828" y="1888271"/>
+            <a:off x="8334479" y="3646840"/>
             <a:ext cx="228600" cy="438359"/>
             <a:chOff x="2438400" y="3082158"/>
             <a:chExt cx="228600" cy="438359"/>
@@ -12416,8 +11039,8 @@
         </p:nvSpPr>
         <p:spPr>
           <a:xfrm>
-            <a:off x="5836391" y="2188243"/>
-            <a:ext cx="482824" cy="307777"/>
+            <a:off x="7978209" y="3980319"/>
+            <a:ext cx="947695" cy="369332"/>
           </a:xfrm>
           <a:prstGeom prst="rect">
             <a:avLst/>
@@ -12431,46 +11054,9 @@
           <a:lstStyle/>
           <a:p>
             <a:r>
-              <a:rPr lang="en-US" sz="700" i="1" dirty="0" smtClean="0"/>
+              <a:rPr lang="en-US" i="1" dirty="0" smtClean="0"/>
               <a:t>braking </a:t>
             </a:r>
-          </a:p>
-          <a:p>
-            <a:r>
-              <a:rPr lang="en-US" sz="700" i="1" dirty="0" smtClean="0"/>
-              <a:t>valve</a:t>
-            </a:r>
-            <a:endParaRPr lang="en-US" i="1" dirty="0"/>
-          </a:p>
-        </p:txBody>
-      </p:sp>
-      <p:sp>
-        <p:nvSpPr>
-          <p:cNvPr id="110" name="TextBox 109"/>
-          <p:cNvSpPr txBox="1"/>
-          <p:nvPr/>
-        </p:nvSpPr>
-        <p:spPr>
-          <a:xfrm>
-            <a:off x="3195932" y="-12700"/>
-            <a:ext cx="465192" cy="261610"/>
-          </a:xfrm>
-          <a:prstGeom prst="rect">
-            <a:avLst/>
-          </a:prstGeom>
-          <a:noFill/>
-        </p:spPr>
-        <p:txBody>
-          <a:bodyPr wrap="none" rtlCol="0">
-            <a:spAutoFit/>
-          </a:bodyPr>
-          <a:lstStyle/>
-          <a:p>
-            <a:r>
-              <a:rPr lang="en-US" sz="1100" i="1" dirty="0" smtClean="0"/>
-              <a:t>seals</a:t>
-            </a:r>
-            <a:endParaRPr lang="en-US" i="1" dirty="0"/>
           </a:p>
         </p:txBody>
       </p:sp>
@@ -12482,8 +11068,8 @@
         </p:nvCxnSpPr>
         <p:spPr>
           <a:xfrm>
-            <a:off x="3885128" y="1654104"/>
-            <a:ext cx="0" cy="384315"/>
+            <a:off x="5034996" y="3352800"/>
+            <a:ext cx="0" cy="409201"/>
           </a:xfrm>
           <a:prstGeom prst="line">
             <a:avLst/>
@@ -12514,15 +11100,13 @@
       <p:cxnSp>
         <p:nvCxnSpPr>
           <p:cNvPr id="112" name="Straight Connector 111"/>
-          <p:cNvCxnSpPr>
-            <a:endCxn id="113" idx="3"/>
-          </p:cNvCxnSpPr>
+          <p:cNvCxnSpPr/>
           <p:nvPr/>
         </p:nvCxnSpPr>
         <p:spPr>
           <a:xfrm flipH="1">
-            <a:off x="3827770" y="2038419"/>
-            <a:ext cx="60534" cy="0"/>
+            <a:off x="4526787" y="3752071"/>
+            <a:ext cx="1" cy="384825"/>
           </a:xfrm>
           <a:prstGeom prst="line">
             <a:avLst/>
@@ -12552,69 +11136,24 @@
       </p:cxnSp>
       <p:sp>
         <p:nvSpPr>
-          <p:cNvPr id="113" name="Rectangle 112"/>
-          <p:cNvSpPr/>
-          <p:nvPr/>
-        </p:nvSpPr>
-        <p:spPr>
-          <a:xfrm>
-            <a:off x="3337671" y="1905865"/>
-            <a:ext cx="490099" cy="265108"/>
-          </a:xfrm>
-          <a:prstGeom prst="rect">
-            <a:avLst/>
-          </a:prstGeom>
-          <a:noFill/>
-          <a:ln w="15875">
-            <a:solidFill>
-              <a:schemeClr val="tx1"/>
-            </a:solidFill>
-          </a:ln>
-        </p:spPr>
-        <p:style>
-          <a:lnRef idx="2">
-            <a:schemeClr val="accent1">
-              <a:shade val="50000"/>
-            </a:schemeClr>
-          </a:lnRef>
-          <a:fillRef idx="1">
-            <a:schemeClr val="accent1"/>
-          </a:fillRef>
-          <a:effectRef idx="0">
-            <a:schemeClr val="accent1"/>
-          </a:effectRef>
-          <a:fontRef idx="minor">
-            <a:schemeClr val="lt1"/>
-          </a:fontRef>
-        </p:style>
-        <p:txBody>
-          <a:bodyPr rtlCol="0" anchor="ctr"/>
-          <a:lstStyle/>
-          <a:p>
-            <a:pPr algn="ctr"/>
-            <a:endParaRPr lang="en-US" dirty="0" smtClean="0">
-              <a:solidFill>
-                <a:schemeClr val="tx1"/>
-              </a:solidFill>
-            </a:endParaRPr>
-          </a:p>
-        </p:txBody>
-      </p:sp>
-      <p:sp>
-        <p:nvSpPr>
           <p:cNvPr id="114" name="TextBox 113"/>
           <p:cNvSpPr txBox="1"/>
           <p:nvPr/>
         </p:nvSpPr>
         <p:spPr>
           <a:xfrm>
-            <a:off x="3293464" y="1859902"/>
-            <a:ext cx="735803" cy="338554"/>
+            <a:off x="4002117" y="4140910"/>
+            <a:ext cx="1063823" cy="646331"/>
           </a:xfrm>
           <a:prstGeom prst="rect">
             <a:avLst/>
           </a:prstGeom>
           <a:noFill/>
+          <a:ln w="19050">
+            <a:solidFill>
+              <a:schemeClr val="tx1"/>
+            </a:solidFill>
+          </a:ln>
         </p:spPr>
         <p:txBody>
           <a:bodyPr wrap="square" rtlCol="0">
@@ -12623,17 +11162,17 @@
           <a:lstStyle/>
           <a:p>
             <a:r>
-              <a:rPr lang="en-US" sz="800" i="1" dirty="0"/>
+              <a:rPr lang="en-US" i="1" dirty="0"/>
               <a:t>r</a:t>
             </a:r>
             <a:r>
-              <a:rPr lang="en-US" sz="800" i="1" dirty="0" smtClean="0"/>
+              <a:rPr lang="en-US" i="1" dirty="0" smtClean="0"/>
               <a:t>oughing</a:t>
             </a:r>
           </a:p>
           <a:p>
             <a:r>
-              <a:rPr lang="en-US" sz="800" i="1" dirty="0" smtClean="0"/>
+              <a:rPr lang="en-US" i="1" dirty="0" smtClean="0"/>
               <a:t>pump 3</a:t>
             </a:r>
           </a:p>
@@ -12647,8 +11186,8 @@
         </p:nvCxnSpPr>
         <p:spPr>
           <a:xfrm>
-            <a:off x="3344207" y="1335479"/>
-            <a:ext cx="0" cy="384315"/>
+            <a:off x="4343400" y="2809501"/>
+            <a:ext cx="0" cy="952500"/>
           </a:xfrm>
           <a:prstGeom prst="line">
             <a:avLst/>
@@ -12684,8 +11223,988 @@
         </p:nvCxnSpPr>
         <p:spPr>
           <a:xfrm flipH="1">
-            <a:off x="3344208" y="1719794"/>
-            <a:ext cx="540920" cy="0"/>
+            <a:off x="4343401" y="3762001"/>
+            <a:ext cx="691595" cy="0"/>
+          </a:xfrm>
+          <a:prstGeom prst="line">
+            <a:avLst/>
+          </a:prstGeom>
+          <a:ln w="19050">
+            <a:solidFill>
+              <a:schemeClr val="tx1"/>
+            </a:solidFill>
+            <a:headEnd type="none"/>
+            <a:tailEnd type="none"/>
+          </a:ln>
+        </p:spPr>
+        <p:style>
+          <a:lnRef idx="1">
+            <a:schemeClr val="accent1"/>
+          </a:lnRef>
+          <a:fillRef idx="0">
+            <a:schemeClr val="accent1"/>
+          </a:fillRef>
+          <a:effectRef idx="0">
+            <a:schemeClr val="accent1"/>
+          </a:effectRef>
+          <a:fontRef idx="minor">
+            <a:schemeClr val="tx1"/>
+          </a:fontRef>
+        </p:style>
+      </p:cxnSp>
+      <p:sp>
+        <p:nvSpPr>
+          <p:cNvPr id="90" name="Rectangle 89"/>
+          <p:cNvSpPr/>
+          <p:nvPr/>
+        </p:nvSpPr>
+        <p:spPr>
+          <a:xfrm>
+            <a:off x="3209170" y="1136142"/>
+            <a:ext cx="968098" cy="1842098"/>
+          </a:xfrm>
+          <a:prstGeom prst="rect">
+            <a:avLst/>
+          </a:prstGeom>
+          <a:noFill/>
+          <a:ln w="15875">
+            <a:solidFill>
+              <a:schemeClr val="tx1"/>
+            </a:solidFill>
+          </a:ln>
+        </p:spPr>
+        <p:style>
+          <a:lnRef idx="2">
+            <a:schemeClr val="accent1">
+              <a:shade val="50000"/>
+            </a:schemeClr>
+          </a:lnRef>
+          <a:fillRef idx="1">
+            <a:schemeClr val="accent1"/>
+          </a:fillRef>
+          <a:effectRef idx="0">
+            <a:schemeClr val="accent1"/>
+          </a:effectRef>
+          <a:fontRef idx="minor">
+            <a:schemeClr val="lt1"/>
+          </a:fontRef>
+        </p:style>
+        <p:txBody>
+          <a:bodyPr rtlCol="0" anchor="ctr"/>
+          <a:lstStyle/>
+          <a:p>
+            <a:pPr algn="ctr"/>
+            <a:endParaRPr lang="en-US" sz="2400" dirty="0" smtClean="0">
+              <a:solidFill>
+                <a:schemeClr val="tx1"/>
+              </a:solidFill>
+            </a:endParaRPr>
+          </a:p>
+        </p:txBody>
+      </p:sp>
+      <p:sp>
+        <p:nvSpPr>
+          <p:cNvPr id="91" name="Rectangle 90"/>
+          <p:cNvSpPr/>
+          <p:nvPr/>
+        </p:nvSpPr>
+        <p:spPr>
+          <a:xfrm>
+            <a:off x="823521" y="1215390"/>
+            <a:ext cx="3309089" cy="1684020"/>
+          </a:xfrm>
+          <a:prstGeom prst="rect">
+            <a:avLst/>
+          </a:prstGeom>
+          <a:noFill/>
+          <a:ln w="15875">
+            <a:solidFill>
+              <a:schemeClr val="tx1"/>
+            </a:solidFill>
+          </a:ln>
+        </p:spPr>
+        <p:style>
+          <a:lnRef idx="2">
+            <a:schemeClr val="accent1">
+              <a:shade val="50000"/>
+            </a:schemeClr>
+          </a:lnRef>
+          <a:fillRef idx="1">
+            <a:schemeClr val="accent1"/>
+          </a:fillRef>
+          <a:effectRef idx="0">
+            <a:schemeClr val="accent1"/>
+          </a:effectRef>
+          <a:fontRef idx="minor">
+            <a:schemeClr val="lt1"/>
+          </a:fontRef>
+        </p:style>
+        <p:txBody>
+          <a:bodyPr rtlCol="0" anchor="ctr"/>
+          <a:lstStyle/>
+          <a:p>
+            <a:pPr algn="ctr"/>
+            <a:endParaRPr lang="en-US" sz="2400" dirty="0" smtClean="0">
+              <a:solidFill>
+                <a:schemeClr val="tx1"/>
+              </a:solidFill>
+            </a:endParaRPr>
+          </a:p>
+        </p:txBody>
+      </p:sp>
+      <p:sp>
+        <p:nvSpPr>
+          <p:cNvPr id="93" name="Rectangle 92"/>
+          <p:cNvSpPr/>
+          <p:nvPr/>
+        </p:nvSpPr>
+        <p:spPr>
+          <a:xfrm>
+            <a:off x="5040216" y="697226"/>
+            <a:ext cx="3166029" cy="2590801"/>
+          </a:xfrm>
+          <a:prstGeom prst="rect">
+            <a:avLst/>
+          </a:prstGeom>
+          <a:noFill/>
+          <a:ln w="15875">
+            <a:solidFill>
+              <a:schemeClr val="tx1"/>
+            </a:solidFill>
+          </a:ln>
+        </p:spPr>
+        <p:style>
+          <a:lnRef idx="2">
+            <a:schemeClr val="accent1">
+              <a:shade val="50000"/>
+            </a:schemeClr>
+          </a:lnRef>
+          <a:fillRef idx="1">
+            <a:schemeClr val="accent1"/>
+          </a:fillRef>
+          <a:effectRef idx="0">
+            <a:schemeClr val="accent1"/>
+          </a:effectRef>
+          <a:fontRef idx="minor">
+            <a:schemeClr val="lt1"/>
+          </a:fontRef>
+        </p:style>
+        <p:txBody>
+          <a:bodyPr rtlCol="0" anchor="ctr"/>
+          <a:lstStyle/>
+          <a:p>
+            <a:pPr algn="ctr"/>
+            <a:endParaRPr lang="en-US" sz="2400" dirty="0" smtClean="0">
+              <a:solidFill>
+                <a:schemeClr val="tx1"/>
+              </a:solidFill>
+            </a:endParaRPr>
+          </a:p>
+        </p:txBody>
+      </p:sp>
+      <p:grpSp>
+        <p:nvGrpSpPr>
+          <p:cNvPr id="94" name="Group 93"/>
+          <p:cNvGrpSpPr/>
+          <p:nvPr/>
+        </p:nvGrpSpPr>
+        <p:grpSpPr>
+          <a:xfrm rot="5400000">
+            <a:off x="4390472" y="1560056"/>
+            <a:ext cx="388620" cy="910867"/>
+            <a:chOff x="2438400" y="3082158"/>
+            <a:chExt cx="228600" cy="381000"/>
+          </a:xfrm>
+        </p:grpSpPr>
+        <p:sp>
+          <p:nvSpPr>
+            <p:cNvPr id="95" name="Isosceles Triangle 94"/>
+            <p:cNvSpPr/>
+            <p:nvPr/>
+          </p:nvSpPr>
+          <p:spPr>
+            <a:xfrm>
+              <a:off x="2514600" y="3255579"/>
+              <a:ext cx="152400" cy="131379"/>
+            </a:xfrm>
+            <a:prstGeom prst="triangle">
+              <a:avLst/>
+            </a:prstGeom>
+            <a:noFill/>
+            <a:ln w="15875">
+              <a:solidFill>
+                <a:schemeClr val="tx1"/>
+              </a:solidFill>
+            </a:ln>
+          </p:spPr>
+          <p:style>
+            <a:lnRef idx="2">
+              <a:schemeClr val="accent1">
+                <a:shade val="50000"/>
+              </a:schemeClr>
+            </a:lnRef>
+            <a:fillRef idx="1">
+              <a:schemeClr val="accent1"/>
+            </a:fillRef>
+            <a:effectRef idx="0">
+              <a:schemeClr val="accent1"/>
+            </a:effectRef>
+            <a:fontRef idx="minor">
+              <a:schemeClr val="lt1"/>
+            </a:fontRef>
+          </p:style>
+          <p:txBody>
+            <a:bodyPr rtlCol="0" anchor="ctr"/>
+            <a:lstStyle/>
+            <a:p>
+              <a:pPr algn="ctr"/>
+              <a:endParaRPr lang="en-US" sz="2400" dirty="0" smtClean="0">
+                <a:solidFill>
+                  <a:schemeClr val="tx1"/>
+                </a:solidFill>
+              </a:endParaRPr>
+            </a:p>
+          </p:txBody>
+        </p:sp>
+        <p:sp>
+          <p:nvSpPr>
+            <p:cNvPr id="98" name="Isosceles Triangle 97"/>
+            <p:cNvSpPr/>
+            <p:nvPr/>
+          </p:nvSpPr>
+          <p:spPr>
+            <a:xfrm flipV="1">
+              <a:off x="2514600" y="3124200"/>
+              <a:ext cx="152400" cy="131379"/>
+            </a:xfrm>
+            <a:prstGeom prst="triangle">
+              <a:avLst/>
+            </a:prstGeom>
+            <a:noFill/>
+            <a:ln w="15875">
+              <a:solidFill>
+                <a:schemeClr val="tx1"/>
+              </a:solidFill>
+            </a:ln>
+          </p:spPr>
+          <p:style>
+            <a:lnRef idx="2">
+              <a:schemeClr val="accent1">
+                <a:shade val="50000"/>
+              </a:schemeClr>
+            </a:lnRef>
+            <a:fillRef idx="1">
+              <a:schemeClr val="accent1"/>
+            </a:fillRef>
+            <a:effectRef idx="0">
+              <a:schemeClr val="accent1"/>
+            </a:effectRef>
+            <a:fontRef idx="minor">
+              <a:schemeClr val="lt1"/>
+            </a:fontRef>
+          </p:style>
+          <p:txBody>
+            <a:bodyPr rtlCol="0" anchor="ctr"/>
+            <a:lstStyle/>
+            <a:p>
+              <a:pPr algn="ctr"/>
+              <a:endParaRPr lang="en-US" sz="2400" dirty="0" smtClean="0">
+                <a:solidFill>
+                  <a:schemeClr val="tx1"/>
+                </a:solidFill>
+              </a:endParaRPr>
+            </a:p>
+          </p:txBody>
+        </p:sp>
+        <p:cxnSp>
+          <p:nvCxnSpPr>
+            <p:cNvPr id="99" name="Straight Connector 98"/>
+            <p:cNvCxnSpPr>
+              <a:stCxn id="98" idx="0"/>
+            </p:cNvCxnSpPr>
+            <p:nvPr/>
+          </p:nvCxnSpPr>
+          <p:spPr>
+            <a:xfrm flipH="1">
+              <a:off x="2438400" y="3255579"/>
+              <a:ext cx="152400" cy="0"/>
+            </a:xfrm>
+            <a:prstGeom prst="line">
+              <a:avLst/>
+            </a:prstGeom>
+            <a:ln w="19050">
+              <a:solidFill>
+                <a:schemeClr val="tx1"/>
+              </a:solidFill>
+              <a:headEnd type="triangle"/>
+              <a:tailEnd type="none"/>
+            </a:ln>
+          </p:spPr>
+          <p:style>
+            <a:lnRef idx="1">
+              <a:schemeClr val="accent1"/>
+            </a:lnRef>
+            <a:fillRef idx="0">
+              <a:schemeClr val="accent1"/>
+            </a:fillRef>
+            <a:effectRef idx="0">
+              <a:schemeClr val="accent1"/>
+            </a:effectRef>
+            <a:fontRef idx="minor">
+              <a:schemeClr val="tx1"/>
+            </a:fontRef>
+          </p:style>
+        </p:cxnSp>
+        <p:cxnSp>
+          <p:nvCxnSpPr>
+            <p:cNvPr id="106" name="Straight Connector 105"/>
+            <p:cNvCxnSpPr>
+              <a:stCxn id="98" idx="3"/>
+            </p:cNvCxnSpPr>
+            <p:nvPr/>
+          </p:nvCxnSpPr>
+          <p:spPr>
+            <a:xfrm rot="16200000" flipV="1">
+              <a:off x="2569780" y="3103178"/>
+              <a:ext cx="42041" cy="1"/>
+            </a:xfrm>
+            <a:prstGeom prst="line">
+              <a:avLst/>
+            </a:prstGeom>
+            <a:ln w="19050">
+              <a:solidFill>
+                <a:schemeClr val="tx1"/>
+              </a:solidFill>
+              <a:headEnd type="none"/>
+              <a:tailEnd type="none"/>
+            </a:ln>
+          </p:spPr>
+          <p:style>
+            <a:lnRef idx="1">
+              <a:schemeClr val="accent1"/>
+            </a:lnRef>
+            <a:fillRef idx="0">
+              <a:schemeClr val="accent1"/>
+            </a:fillRef>
+            <a:effectRef idx="0">
+              <a:schemeClr val="accent1"/>
+            </a:effectRef>
+            <a:fontRef idx="minor">
+              <a:schemeClr val="tx1"/>
+            </a:fontRef>
+          </p:style>
+        </p:cxnSp>
+        <p:cxnSp>
+          <p:nvCxnSpPr>
+            <p:cNvPr id="115" name="Straight Connector 114"/>
+            <p:cNvCxnSpPr/>
+            <p:nvPr/>
+          </p:nvCxnSpPr>
+          <p:spPr>
+            <a:xfrm rot="16200000">
+              <a:off x="2552700" y="3425058"/>
+              <a:ext cx="76200" cy="0"/>
+            </a:xfrm>
+            <a:prstGeom prst="line">
+              <a:avLst/>
+            </a:prstGeom>
+            <a:ln w="19050">
+              <a:solidFill>
+                <a:schemeClr val="tx1"/>
+              </a:solidFill>
+              <a:headEnd type="none"/>
+              <a:tailEnd type="none"/>
+            </a:ln>
+          </p:spPr>
+          <p:style>
+            <a:lnRef idx="1">
+              <a:schemeClr val="accent1"/>
+            </a:lnRef>
+            <a:fillRef idx="0">
+              <a:schemeClr val="accent1"/>
+            </a:fillRef>
+            <a:effectRef idx="0">
+              <a:schemeClr val="accent1"/>
+            </a:effectRef>
+            <a:fontRef idx="minor">
+              <a:schemeClr val="tx1"/>
+            </a:fontRef>
+          </p:style>
+        </p:cxnSp>
+      </p:grpSp>
+      <p:grpSp>
+        <p:nvGrpSpPr>
+          <p:cNvPr id="116" name="Group 115"/>
+          <p:cNvGrpSpPr/>
+          <p:nvPr/>
+        </p:nvGrpSpPr>
+        <p:grpSpPr>
+          <a:xfrm>
+            <a:off x="2880990" y="2033581"/>
+            <a:ext cx="364348" cy="129542"/>
+            <a:chOff x="3139472" y="1481137"/>
+            <a:chExt cx="152400" cy="76201"/>
+          </a:xfrm>
+        </p:grpSpPr>
+        <p:sp>
+          <p:nvSpPr>
+            <p:cNvPr id="117" name="Isosceles Triangle 116"/>
+            <p:cNvSpPr/>
+            <p:nvPr/>
+          </p:nvSpPr>
+          <p:spPr>
+            <a:xfrm rot="16200000">
+              <a:off x="3177572" y="1443037"/>
+              <a:ext cx="76200" cy="152400"/>
+            </a:xfrm>
+            <a:prstGeom prst="triangle">
+              <a:avLst/>
+            </a:prstGeom>
+            <a:solidFill>
+              <a:schemeClr val="bg1"/>
+            </a:solidFill>
+            <a:ln w="15875">
+              <a:noFill/>
+            </a:ln>
+          </p:spPr>
+          <p:style>
+            <a:lnRef idx="2">
+              <a:schemeClr val="accent1">
+                <a:shade val="50000"/>
+              </a:schemeClr>
+            </a:lnRef>
+            <a:fillRef idx="1">
+              <a:schemeClr val="accent1"/>
+            </a:fillRef>
+            <a:effectRef idx="0">
+              <a:schemeClr val="accent1"/>
+            </a:effectRef>
+            <a:fontRef idx="minor">
+              <a:schemeClr val="lt1"/>
+            </a:fontRef>
+          </p:style>
+          <p:txBody>
+            <a:bodyPr rtlCol="0" anchor="ctr"/>
+            <a:lstStyle/>
+            <a:p>
+              <a:pPr algn="ctr"/>
+              <a:endParaRPr lang="en-US" sz="2400" dirty="0" smtClean="0">
+                <a:solidFill>
+                  <a:schemeClr val="tx1"/>
+                </a:solidFill>
+              </a:endParaRPr>
+            </a:p>
+          </p:txBody>
+        </p:sp>
+        <p:cxnSp>
+          <p:nvCxnSpPr>
+            <p:cNvPr id="118" name="Straight Connector 117"/>
+            <p:cNvCxnSpPr/>
+            <p:nvPr/>
+          </p:nvCxnSpPr>
+          <p:spPr>
+            <a:xfrm flipH="1">
+              <a:off x="3200400" y="1481137"/>
+              <a:ext cx="76200" cy="19050"/>
+            </a:xfrm>
+            <a:prstGeom prst="line">
+              <a:avLst/>
+            </a:prstGeom>
+            <a:ln w="19050">
+              <a:solidFill>
+                <a:schemeClr val="tx1"/>
+              </a:solidFill>
+              <a:headEnd type="none"/>
+              <a:tailEnd type="none"/>
+            </a:ln>
+          </p:spPr>
+          <p:style>
+            <a:lnRef idx="1">
+              <a:schemeClr val="accent1"/>
+            </a:lnRef>
+            <a:fillRef idx="0">
+              <a:schemeClr val="accent1"/>
+            </a:fillRef>
+            <a:effectRef idx="0">
+              <a:schemeClr val="accent1"/>
+            </a:effectRef>
+            <a:fontRef idx="minor">
+              <a:schemeClr val="tx1"/>
+            </a:fontRef>
+          </p:style>
+        </p:cxnSp>
+        <p:cxnSp>
+          <p:nvCxnSpPr>
+            <p:cNvPr id="119" name="Straight Connector 118"/>
+            <p:cNvCxnSpPr/>
+            <p:nvPr/>
+          </p:nvCxnSpPr>
+          <p:spPr>
+            <a:xfrm flipH="1" flipV="1">
+              <a:off x="3200400" y="1538287"/>
+              <a:ext cx="76200" cy="19051"/>
+            </a:xfrm>
+            <a:prstGeom prst="line">
+              <a:avLst/>
+            </a:prstGeom>
+            <a:ln w="19050">
+              <a:solidFill>
+                <a:schemeClr val="tx1"/>
+              </a:solidFill>
+              <a:headEnd type="none"/>
+              <a:tailEnd type="none"/>
+            </a:ln>
+          </p:spPr>
+          <p:style>
+            <a:lnRef idx="1">
+              <a:schemeClr val="accent1"/>
+            </a:lnRef>
+            <a:fillRef idx="0">
+              <a:schemeClr val="accent1"/>
+            </a:fillRef>
+            <a:effectRef idx="0">
+              <a:schemeClr val="accent1"/>
+            </a:effectRef>
+            <a:fontRef idx="minor">
+              <a:schemeClr val="tx1"/>
+            </a:fontRef>
+          </p:style>
+        </p:cxnSp>
+      </p:grpSp>
+      <p:grpSp>
+        <p:nvGrpSpPr>
+          <p:cNvPr id="120" name="Group 119"/>
+          <p:cNvGrpSpPr/>
+          <p:nvPr/>
+        </p:nvGrpSpPr>
+        <p:grpSpPr>
+          <a:xfrm>
+            <a:off x="3200400" y="2030728"/>
+            <a:ext cx="204783" cy="712472"/>
+            <a:chOff x="3291872" y="1452562"/>
+            <a:chExt cx="85657" cy="419101"/>
+          </a:xfrm>
+        </p:grpSpPr>
+        <p:sp>
+          <p:nvSpPr>
+            <p:cNvPr id="123" name="Rectangle 122"/>
+            <p:cNvSpPr/>
+            <p:nvPr/>
+          </p:nvSpPr>
+          <p:spPr>
+            <a:xfrm>
+              <a:off x="3331810" y="1452562"/>
+              <a:ext cx="45719" cy="419101"/>
+            </a:xfrm>
+            <a:prstGeom prst="rect">
+              <a:avLst/>
+            </a:prstGeom>
+            <a:noFill/>
+            <a:ln w="15875">
+              <a:solidFill>
+                <a:schemeClr val="tx1"/>
+              </a:solidFill>
+            </a:ln>
+          </p:spPr>
+          <p:style>
+            <a:lnRef idx="2">
+              <a:schemeClr val="accent1">
+                <a:shade val="50000"/>
+              </a:schemeClr>
+            </a:lnRef>
+            <a:fillRef idx="1">
+              <a:schemeClr val="accent1"/>
+            </a:fillRef>
+            <a:effectRef idx="0">
+              <a:schemeClr val="accent1"/>
+            </a:effectRef>
+            <a:fontRef idx="minor">
+              <a:schemeClr val="lt1"/>
+            </a:fontRef>
+          </p:style>
+          <p:txBody>
+            <a:bodyPr rtlCol="0" anchor="ctr"/>
+            <a:lstStyle/>
+            <a:p>
+              <a:pPr algn="ctr"/>
+              <a:endParaRPr lang="en-US" sz="2400" dirty="0" smtClean="0">
+                <a:solidFill>
+                  <a:schemeClr val="tx1"/>
+                </a:solidFill>
+              </a:endParaRPr>
+            </a:p>
+          </p:txBody>
+        </p:sp>
+        <p:cxnSp>
+          <p:nvCxnSpPr>
+            <p:cNvPr id="124" name="Straight Connector 123"/>
+            <p:cNvCxnSpPr>
+              <a:stCxn id="123" idx="1"/>
+            </p:cNvCxnSpPr>
+            <p:nvPr/>
+          </p:nvCxnSpPr>
+          <p:spPr>
+            <a:xfrm flipH="1" flipV="1">
+              <a:off x="3291872" y="1662112"/>
+              <a:ext cx="39938" cy="1"/>
+            </a:xfrm>
+            <a:prstGeom prst="line">
+              <a:avLst/>
+            </a:prstGeom>
+            <a:ln w="19050">
+              <a:solidFill>
+                <a:schemeClr val="tx1"/>
+              </a:solidFill>
+              <a:headEnd type="none"/>
+              <a:tailEnd type="none"/>
+            </a:ln>
+          </p:spPr>
+          <p:style>
+            <a:lnRef idx="1">
+              <a:schemeClr val="accent1"/>
+            </a:lnRef>
+            <a:fillRef idx="0">
+              <a:schemeClr val="accent1"/>
+            </a:fillRef>
+            <a:effectRef idx="0">
+              <a:schemeClr val="accent1"/>
+            </a:effectRef>
+            <a:fontRef idx="minor">
+              <a:schemeClr val="tx1"/>
+            </a:fontRef>
+          </p:style>
+        </p:cxnSp>
+      </p:grpSp>
+      <p:sp>
+        <p:nvSpPr>
+          <p:cNvPr id="125" name="Isosceles Triangle 124"/>
+          <p:cNvSpPr/>
+          <p:nvPr/>
+        </p:nvSpPr>
+        <p:spPr>
+          <a:xfrm rot="5400000">
+            <a:off x="881596" y="1980661"/>
+            <a:ext cx="129542" cy="216333"/>
+          </a:xfrm>
+          <a:prstGeom prst="triangle">
+            <a:avLst/>
+          </a:prstGeom>
+          <a:noFill/>
+          <a:ln w="15875">
+            <a:solidFill>
+              <a:schemeClr val="tx1"/>
+            </a:solidFill>
+          </a:ln>
+        </p:spPr>
+        <p:style>
+          <a:lnRef idx="2">
+            <a:schemeClr val="accent1">
+              <a:shade val="50000"/>
+            </a:schemeClr>
+          </a:lnRef>
+          <a:fillRef idx="1">
+            <a:schemeClr val="accent1"/>
+          </a:fillRef>
+          <a:effectRef idx="0">
+            <a:schemeClr val="accent1"/>
+          </a:effectRef>
+          <a:fontRef idx="minor">
+            <a:schemeClr val="lt1"/>
+          </a:fontRef>
+        </p:style>
+        <p:txBody>
+          <a:bodyPr rtlCol="0" anchor="ctr"/>
+          <a:lstStyle/>
+          <a:p>
+            <a:pPr algn="ctr"/>
+            <a:endParaRPr lang="en-US" sz="2400" dirty="0" smtClean="0">
+              <a:solidFill>
+                <a:schemeClr val="tx1"/>
+              </a:solidFill>
+            </a:endParaRPr>
+          </a:p>
+        </p:txBody>
+      </p:sp>
+      <p:sp>
+        <p:nvSpPr>
+          <p:cNvPr id="126" name="TextBox 125"/>
+          <p:cNvSpPr txBox="1"/>
+          <p:nvPr/>
+        </p:nvSpPr>
+        <p:spPr>
+          <a:xfrm>
+            <a:off x="1562813" y="1136142"/>
+            <a:ext cx="1334422" cy="461665"/>
+          </a:xfrm>
+          <a:prstGeom prst="rect">
+            <a:avLst/>
+          </a:prstGeom>
+          <a:noFill/>
+        </p:spPr>
+        <p:txBody>
+          <a:bodyPr wrap="square" rtlCol="0">
+            <a:spAutoFit/>
+          </a:bodyPr>
+          <a:lstStyle/>
+          <a:p>
+            <a:r>
+              <a:rPr lang="en-US" sz="2400" i="1" dirty="0" smtClean="0"/>
+              <a:t>source</a:t>
+            </a:r>
+            <a:endParaRPr lang="en-US" sz="2400" i="1" dirty="0"/>
+          </a:p>
+        </p:txBody>
+      </p:sp>
+      <p:sp>
+        <p:nvSpPr>
+          <p:cNvPr id="127" name="TextBox 126"/>
+          <p:cNvSpPr txBox="1"/>
+          <p:nvPr/>
+        </p:nvSpPr>
+        <p:spPr>
+          <a:xfrm>
+            <a:off x="3209172" y="1136142"/>
+            <a:ext cx="1269273" cy="461665"/>
+          </a:xfrm>
+          <a:prstGeom prst="rect">
+            <a:avLst/>
+          </a:prstGeom>
+          <a:noFill/>
+        </p:spPr>
+        <p:txBody>
+          <a:bodyPr wrap="square" rtlCol="0">
+            <a:spAutoFit/>
+          </a:bodyPr>
+          <a:lstStyle/>
+          <a:p>
+            <a:r>
+              <a:rPr lang="en-US" sz="2400" i="1" dirty="0" smtClean="0"/>
+              <a:t>buffer</a:t>
+            </a:r>
+            <a:endParaRPr lang="en-US" sz="2400" i="1" dirty="0"/>
+          </a:p>
+        </p:txBody>
+      </p:sp>
+      <p:sp>
+        <p:nvSpPr>
+          <p:cNvPr id="128" name="TextBox 127"/>
+          <p:cNvSpPr txBox="1"/>
+          <p:nvPr/>
+        </p:nvSpPr>
+        <p:spPr>
+          <a:xfrm>
+            <a:off x="6174579" y="637132"/>
+            <a:ext cx="1131306" cy="461665"/>
+          </a:xfrm>
+          <a:prstGeom prst="rect">
+            <a:avLst/>
+          </a:prstGeom>
+          <a:noFill/>
+        </p:spPr>
+        <p:txBody>
+          <a:bodyPr wrap="square" rtlCol="0">
+            <a:spAutoFit/>
+          </a:bodyPr>
+          <a:lstStyle/>
+          <a:p>
+            <a:r>
+              <a:rPr lang="en-US" sz="2400" i="1" dirty="0" smtClean="0"/>
+              <a:t>main</a:t>
+            </a:r>
+            <a:endParaRPr lang="en-US" sz="2400" i="1" dirty="0"/>
+          </a:p>
+        </p:txBody>
+      </p:sp>
+      <p:sp>
+        <p:nvSpPr>
+          <p:cNvPr id="129" name="TextBox 128"/>
+          <p:cNvSpPr txBox="1"/>
+          <p:nvPr/>
+        </p:nvSpPr>
+        <p:spPr>
+          <a:xfrm>
+            <a:off x="756702" y="2111829"/>
+            <a:ext cx="985678" cy="369332"/>
+          </a:xfrm>
+          <a:prstGeom prst="rect">
+            <a:avLst/>
+          </a:prstGeom>
+          <a:noFill/>
+        </p:spPr>
+        <p:txBody>
+          <a:bodyPr wrap="square" rtlCol="0">
+            <a:spAutoFit/>
+          </a:bodyPr>
+          <a:lstStyle/>
+          <a:p>
+            <a:r>
+              <a:rPr lang="en-US" i="1" dirty="0" smtClean="0"/>
+              <a:t>nozzle</a:t>
+            </a:r>
+            <a:endParaRPr lang="en-US" i="1" dirty="0"/>
+          </a:p>
+        </p:txBody>
+      </p:sp>
+      <p:sp>
+        <p:nvSpPr>
+          <p:cNvPr id="132" name="TextBox 131"/>
+          <p:cNvSpPr txBox="1"/>
+          <p:nvPr/>
+        </p:nvSpPr>
+        <p:spPr>
+          <a:xfrm>
+            <a:off x="4141374" y="2133600"/>
+            <a:ext cx="1192626" cy="615553"/>
+          </a:xfrm>
+          <a:prstGeom prst="rect">
+            <a:avLst/>
+          </a:prstGeom>
+          <a:noFill/>
+        </p:spPr>
+        <p:txBody>
+          <a:bodyPr wrap="square" rtlCol="0">
+            <a:spAutoFit/>
+          </a:bodyPr>
+          <a:lstStyle/>
+          <a:p>
+            <a:r>
+              <a:rPr lang="en-US" sz="1700" i="1" dirty="0"/>
+              <a:t>i</a:t>
+            </a:r>
+            <a:r>
+              <a:rPr lang="en-US" sz="1700" i="1" dirty="0" smtClean="0"/>
+              <a:t>solation</a:t>
+            </a:r>
+          </a:p>
+          <a:p>
+            <a:r>
+              <a:rPr lang="en-US" sz="1700" i="1" dirty="0" smtClean="0"/>
+              <a:t>valve</a:t>
+            </a:r>
+            <a:endParaRPr lang="en-US" sz="1700" i="1" dirty="0"/>
+          </a:p>
+        </p:txBody>
+      </p:sp>
+      <p:sp>
+        <p:nvSpPr>
+          <p:cNvPr id="135" name="Rectangle 134"/>
+          <p:cNvSpPr/>
+          <p:nvPr/>
+        </p:nvSpPr>
+        <p:spPr>
+          <a:xfrm>
+            <a:off x="4984363" y="637132"/>
+            <a:ext cx="626589" cy="2715668"/>
+          </a:xfrm>
+          <a:prstGeom prst="rect">
+            <a:avLst/>
+          </a:prstGeom>
+          <a:noFill/>
+          <a:ln w="15875">
+            <a:solidFill>
+              <a:schemeClr val="tx1"/>
+            </a:solidFill>
+          </a:ln>
+        </p:spPr>
+        <p:style>
+          <a:lnRef idx="2">
+            <a:schemeClr val="accent1">
+              <a:shade val="50000"/>
+            </a:schemeClr>
+          </a:lnRef>
+          <a:fillRef idx="1">
+            <a:schemeClr val="accent1"/>
+          </a:fillRef>
+          <a:effectRef idx="0">
+            <a:schemeClr val="accent1"/>
+          </a:effectRef>
+          <a:fontRef idx="minor">
+            <a:schemeClr val="lt1"/>
+          </a:fontRef>
+        </p:style>
+        <p:txBody>
+          <a:bodyPr rtlCol="0" anchor="ctr"/>
+          <a:lstStyle/>
+          <a:p>
+            <a:pPr algn="ctr"/>
+            <a:endParaRPr lang="en-US" sz="2400" dirty="0" smtClean="0">
+              <a:solidFill>
+                <a:schemeClr val="tx1"/>
+              </a:solidFill>
+            </a:endParaRPr>
+          </a:p>
+        </p:txBody>
+      </p:sp>
+      <p:sp>
+        <p:nvSpPr>
+          <p:cNvPr id="136" name="TextBox 135"/>
+          <p:cNvSpPr txBox="1"/>
+          <p:nvPr/>
+        </p:nvSpPr>
+        <p:spPr>
+          <a:xfrm>
+            <a:off x="3551401" y="773164"/>
+            <a:ext cx="1269273" cy="461665"/>
+          </a:xfrm>
+          <a:prstGeom prst="rect">
+            <a:avLst/>
+          </a:prstGeom>
+          <a:noFill/>
+        </p:spPr>
+        <p:txBody>
+          <a:bodyPr wrap="square" rtlCol="0">
+            <a:spAutoFit/>
+          </a:bodyPr>
+          <a:lstStyle/>
+          <a:p>
+            <a:r>
+              <a:rPr lang="en-US" sz="2400" i="1" dirty="0" smtClean="0"/>
+              <a:t>seals</a:t>
+            </a:r>
+            <a:endParaRPr lang="en-US" sz="2400" i="1" dirty="0"/>
+          </a:p>
+        </p:txBody>
+      </p:sp>
+      <p:sp>
+        <p:nvSpPr>
+          <p:cNvPr id="137" name="TextBox 136"/>
+          <p:cNvSpPr txBox="1"/>
+          <p:nvPr/>
+        </p:nvSpPr>
+        <p:spPr>
+          <a:xfrm>
+            <a:off x="4877379" y="284192"/>
+            <a:ext cx="1269273" cy="461665"/>
+          </a:xfrm>
+          <a:prstGeom prst="rect">
+            <a:avLst/>
+          </a:prstGeom>
+          <a:noFill/>
+        </p:spPr>
+        <p:txBody>
+          <a:bodyPr wrap="square" rtlCol="0">
+            <a:spAutoFit/>
+          </a:bodyPr>
+          <a:lstStyle/>
+          <a:p>
+            <a:r>
+              <a:rPr lang="en-US" sz="2400" i="1" dirty="0" smtClean="0"/>
+              <a:t>seals</a:t>
+            </a:r>
+            <a:endParaRPr lang="en-US" sz="2400" i="1" dirty="0"/>
+          </a:p>
+        </p:txBody>
+      </p:sp>
+      <p:cxnSp>
+        <p:nvCxnSpPr>
+          <p:cNvPr id="138" name="Straight Connector 137"/>
+          <p:cNvCxnSpPr/>
+          <p:nvPr/>
+        </p:nvCxnSpPr>
+        <p:spPr>
+          <a:xfrm flipH="1">
+            <a:off x="4186038" y="2809501"/>
+            <a:ext cx="157362" cy="0"/>
           </a:xfrm>
           <a:prstGeom prst="line">
             <a:avLst/>

</xml_diff>